<commit_message>
Expanded detail in presentation. Added notes.
</commit_message>
<xml_diff>
--- a/documentation/IMS-Presentation.pptx
+++ b/documentation/IMS-Presentation.pptx
@@ -4,6 +4,9 @@
   <p:sldMasterIdLst>
     <p:sldMasterId id="2147483720" r:id="rId1"/>
   </p:sldMasterIdLst>
+  <p:notesMasterIdLst>
+    <p:notesMasterId r:id="rId13"/>
+  </p:notesMasterIdLst>
   <p:sldIdLst>
     <p:sldId id="256" r:id="rId2"/>
     <p:sldId id="257" r:id="rId3"/>
@@ -120,6 +123,1062 @@
     </p:ext>
   </p:extLst>
 </p:presentation>
+</file>
+
+<file path=ppt/notesMasters/notesMaster1.xml><?xml version="1.0" encoding="utf-8"?>
+<p:notesMaster xmlns:a="http://schemas.openxmlformats.org/drawingml/2006/main" xmlns:r="http://schemas.openxmlformats.org/officeDocument/2006/relationships" xmlns:p="http://schemas.openxmlformats.org/presentationml/2006/main">
+  <p:cSld>
+    <p:bg>
+      <p:bgRef idx="1001">
+        <a:schemeClr val="bg1"/>
+      </p:bgRef>
+    </p:bg>
+    <p:spTree>
+      <p:nvGrpSpPr>
+        <p:cNvPr id="1" name=""/>
+        <p:cNvGrpSpPr/>
+        <p:nvPr/>
+      </p:nvGrpSpPr>
+      <p:grpSpPr>
+        <a:xfrm>
+          <a:off x="0" y="0"/>
+          <a:ext cx="0" cy="0"/>
+          <a:chOff x="0" y="0"/>
+          <a:chExt cx="0" cy="0"/>
+        </a:xfrm>
+      </p:grpSpPr>
+      <p:sp>
+        <p:nvSpPr>
+          <p:cNvPr id="2" name="Header Placeholder 1"/>
+          <p:cNvSpPr>
+            <a:spLocks noGrp="1"/>
+          </p:cNvSpPr>
+          <p:nvPr>
+            <p:ph type="hdr" sz="quarter"/>
+          </p:nvPr>
+        </p:nvSpPr>
+        <p:spPr>
+          <a:xfrm>
+            <a:off x="0" y="0"/>
+            <a:ext cx="2971800" cy="458788"/>
+          </a:xfrm>
+          <a:prstGeom prst="rect">
+            <a:avLst/>
+          </a:prstGeom>
+        </p:spPr>
+        <p:txBody>
+          <a:bodyPr vert="horz" lIns="91440" tIns="45720" rIns="91440" bIns="45720" rtlCol="0"/>
+          <a:lstStyle>
+            <a:lvl1pPr algn="l">
+              <a:defRPr sz="1200"/>
+            </a:lvl1pPr>
+          </a:lstStyle>
+          <a:p>
+            <a:endParaRPr lang="en-GB"/>
+          </a:p>
+        </p:txBody>
+      </p:sp>
+      <p:sp>
+        <p:nvSpPr>
+          <p:cNvPr id="3" name="Date Placeholder 2"/>
+          <p:cNvSpPr>
+            <a:spLocks noGrp="1"/>
+          </p:cNvSpPr>
+          <p:nvPr>
+            <p:ph type="dt" idx="1"/>
+          </p:nvPr>
+        </p:nvSpPr>
+        <p:spPr>
+          <a:xfrm>
+            <a:off x="3884613" y="0"/>
+            <a:ext cx="2971800" cy="458788"/>
+          </a:xfrm>
+          <a:prstGeom prst="rect">
+            <a:avLst/>
+          </a:prstGeom>
+        </p:spPr>
+        <p:txBody>
+          <a:bodyPr vert="horz" lIns="91440" tIns="45720" rIns="91440" bIns="45720" rtlCol="0"/>
+          <a:lstStyle>
+            <a:lvl1pPr algn="r">
+              <a:defRPr sz="1200"/>
+            </a:lvl1pPr>
+          </a:lstStyle>
+          <a:p>
+            <a:fld id="{D91C57CC-A7FE-443B-A69A-5101445068C9}" type="datetimeFigureOut">
+              <a:rPr lang="en-GB" smtClean="0"/>
+              <a:t>18/09/2020</a:t>
+            </a:fld>
+            <a:endParaRPr lang="en-GB"/>
+          </a:p>
+        </p:txBody>
+      </p:sp>
+      <p:sp>
+        <p:nvSpPr>
+          <p:cNvPr id="4" name="Slide Image Placeholder 3"/>
+          <p:cNvSpPr>
+            <a:spLocks noGrp="1" noRot="1" noChangeAspect="1"/>
+          </p:cNvSpPr>
+          <p:nvPr>
+            <p:ph type="sldImg" idx="2"/>
+          </p:nvPr>
+        </p:nvSpPr>
+        <p:spPr>
+          <a:xfrm>
+            <a:off x="685800" y="1143000"/>
+            <a:ext cx="5486400" cy="3086100"/>
+          </a:xfrm>
+          <a:prstGeom prst="rect">
+            <a:avLst/>
+          </a:prstGeom>
+          <a:noFill/>
+          <a:ln w="12700">
+            <a:solidFill>
+              <a:prstClr val="black"/>
+            </a:solidFill>
+          </a:ln>
+        </p:spPr>
+        <p:txBody>
+          <a:bodyPr vert="horz" lIns="91440" tIns="45720" rIns="91440" bIns="45720" rtlCol="0" anchor="ctr"/>
+          <a:lstStyle/>
+          <a:p>
+            <a:endParaRPr lang="en-GB"/>
+          </a:p>
+        </p:txBody>
+      </p:sp>
+      <p:sp>
+        <p:nvSpPr>
+          <p:cNvPr id="5" name="Notes Placeholder 4"/>
+          <p:cNvSpPr>
+            <a:spLocks noGrp="1"/>
+          </p:cNvSpPr>
+          <p:nvPr>
+            <p:ph type="body" sz="quarter" idx="3"/>
+          </p:nvPr>
+        </p:nvSpPr>
+        <p:spPr>
+          <a:xfrm>
+            <a:off x="685800" y="4400550"/>
+            <a:ext cx="5486400" cy="3600450"/>
+          </a:xfrm>
+          <a:prstGeom prst="rect">
+            <a:avLst/>
+          </a:prstGeom>
+        </p:spPr>
+        <p:txBody>
+          <a:bodyPr vert="horz" lIns="91440" tIns="45720" rIns="91440" bIns="45720" rtlCol="0"/>
+          <a:lstStyle/>
+          <a:p>
+            <a:pPr lvl="0"/>
+            <a:r>
+              <a:rPr lang="en-US"/>
+              <a:t>Click to edit Master text styles</a:t>
+            </a:r>
+          </a:p>
+          <a:p>
+            <a:pPr lvl="1"/>
+            <a:r>
+              <a:rPr lang="en-US"/>
+              <a:t>Second level</a:t>
+            </a:r>
+          </a:p>
+          <a:p>
+            <a:pPr lvl="2"/>
+            <a:r>
+              <a:rPr lang="en-US"/>
+              <a:t>Third level</a:t>
+            </a:r>
+          </a:p>
+          <a:p>
+            <a:pPr lvl="3"/>
+            <a:r>
+              <a:rPr lang="en-US"/>
+              <a:t>Fourth level</a:t>
+            </a:r>
+          </a:p>
+          <a:p>
+            <a:pPr lvl="4"/>
+            <a:r>
+              <a:rPr lang="en-US"/>
+              <a:t>Fifth level</a:t>
+            </a:r>
+            <a:endParaRPr lang="en-GB"/>
+          </a:p>
+        </p:txBody>
+      </p:sp>
+      <p:sp>
+        <p:nvSpPr>
+          <p:cNvPr id="6" name="Footer Placeholder 5"/>
+          <p:cNvSpPr>
+            <a:spLocks noGrp="1"/>
+          </p:cNvSpPr>
+          <p:nvPr>
+            <p:ph type="ftr" sz="quarter" idx="4"/>
+          </p:nvPr>
+        </p:nvSpPr>
+        <p:spPr>
+          <a:xfrm>
+            <a:off x="0" y="8685213"/>
+            <a:ext cx="2971800" cy="458787"/>
+          </a:xfrm>
+          <a:prstGeom prst="rect">
+            <a:avLst/>
+          </a:prstGeom>
+        </p:spPr>
+        <p:txBody>
+          <a:bodyPr vert="horz" lIns="91440" tIns="45720" rIns="91440" bIns="45720" rtlCol="0" anchor="b"/>
+          <a:lstStyle>
+            <a:lvl1pPr algn="l">
+              <a:defRPr sz="1200"/>
+            </a:lvl1pPr>
+          </a:lstStyle>
+          <a:p>
+            <a:endParaRPr lang="en-GB"/>
+          </a:p>
+        </p:txBody>
+      </p:sp>
+      <p:sp>
+        <p:nvSpPr>
+          <p:cNvPr id="7" name="Slide Number Placeholder 6"/>
+          <p:cNvSpPr>
+            <a:spLocks noGrp="1"/>
+          </p:cNvSpPr>
+          <p:nvPr>
+            <p:ph type="sldNum" sz="quarter" idx="5"/>
+          </p:nvPr>
+        </p:nvSpPr>
+        <p:spPr>
+          <a:xfrm>
+            <a:off x="3884613" y="8685213"/>
+            <a:ext cx="2971800" cy="458787"/>
+          </a:xfrm>
+          <a:prstGeom prst="rect">
+            <a:avLst/>
+          </a:prstGeom>
+        </p:spPr>
+        <p:txBody>
+          <a:bodyPr vert="horz" lIns="91440" tIns="45720" rIns="91440" bIns="45720" rtlCol="0" anchor="b"/>
+          <a:lstStyle>
+            <a:lvl1pPr algn="r">
+              <a:defRPr sz="1200"/>
+            </a:lvl1pPr>
+          </a:lstStyle>
+          <a:p>
+            <a:fld id="{5DCBFF80-3A6B-480D-8452-6B1BD2B3F655}" type="slidenum">
+              <a:rPr lang="en-GB" smtClean="0"/>
+              <a:t>‹#›</a:t>
+            </a:fld>
+            <a:endParaRPr lang="en-GB"/>
+          </a:p>
+        </p:txBody>
+      </p:sp>
+    </p:spTree>
+    <p:extLst>
+      <p:ext uri="{BB962C8B-B14F-4D97-AF65-F5344CB8AC3E}">
+        <p14:creationId xmlns:p14="http://schemas.microsoft.com/office/powerpoint/2010/main" val="279419217"/>
+      </p:ext>
+    </p:extLst>
+  </p:cSld>
+  <p:clrMap bg1="lt1" tx1="dk1" bg2="lt2" tx2="dk2" accent1="accent1" accent2="accent2" accent3="accent3" accent4="accent4" accent5="accent5" accent6="accent6" hlink="hlink" folHlink="folHlink"/>
+  <p:notesStyle>
+    <a:lvl1pPr marL="0" algn="l" defTabSz="914400" rtl="0" eaLnBrk="1" latinLnBrk="0" hangingPunct="1">
+      <a:defRPr sz="1200" kern="1200">
+        <a:solidFill>
+          <a:schemeClr val="tx1"/>
+        </a:solidFill>
+        <a:latin typeface="+mn-lt"/>
+        <a:ea typeface="+mn-ea"/>
+        <a:cs typeface="+mn-cs"/>
+      </a:defRPr>
+    </a:lvl1pPr>
+    <a:lvl2pPr marL="457200" algn="l" defTabSz="914400" rtl="0" eaLnBrk="1" latinLnBrk="0" hangingPunct="1">
+      <a:defRPr sz="1200" kern="1200">
+        <a:solidFill>
+          <a:schemeClr val="tx1"/>
+        </a:solidFill>
+        <a:latin typeface="+mn-lt"/>
+        <a:ea typeface="+mn-ea"/>
+        <a:cs typeface="+mn-cs"/>
+      </a:defRPr>
+    </a:lvl2pPr>
+    <a:lvl3pPr marL="914400" algn="l" defTabSz="914400" rtl="0" eaLnBrk="1" latinLnBrk="0" hangingPunct="1">
+      <a:defRPr sz="1200" kern="1200">
+        <a:solidFill>
+          <a:schemeClr val="tx1"/>
+        </a:solidFill>
+        <a:latin typeface="+mn-lt"/>
+        <a:ea typeface="+mn-ea"/>
+        <a:cs typeface="+mn-cs"/>
+      </a:defRPr>
+    </a:lvl3pPr>
+    <a:lvl4pPr marL="1371600" algn="l" defTabSz="914400" rtl="0" eaLnBrk="1" latinLnBrk="0" hangingPunct="1">
+      <a:defRPr sz="1200" kern="1200">
+        <a:solidFill>
+          <a:schemeClr val="tx1"/>
+        </a:solidFill>
+        <a:latin typeface="+mn-lt"/>
+        <a:ea typeface="+mn-ea"/>
+        <a:cs typeface="+mn-cs"/>
+      </a:defRPr>
+    </a:lvl4pPr>
+    <a:lvl5pPr marL="1828800" algn="l" defTabSz="914400" rtl="0" eaLnBrk="1" latinLnBrk="0" hangingPunct="1">
+      <a:defRPr sz="1200" kern="1200">
+        <a:solidFill>
+          <a:schemeClr val="tx1"/>
+        </a:solidFill>
+        <a:latin typeface="+mn-lt"/>
+        <a:ea typeface="+mn-ea"/>
+        <a:cs typeface="+mn-cs"/>
+      </a:defRPr>
+    </a:lvl5pPr>
+    <a:lvl6pPr marL="2286000" algn="l" defTabSz="914400" rtl="0" eaLnBrk="1" latinLnBrk="0" hangingPunct="1">
+      <a:defRPr sz="1200" kern="1200">
+        <a:solidFill>
+          <a:schemeClr val="tx1"/>
+        </a:solidFill>
+        <a:latin typeface="+mn-lt"/>
+        <a:ea typeface="+mn-ea"/>
+        <a:cs typeface="+mn-cs"/>
+      </a:defRPr>
+    </a:lvl6pPr>
+    <a:lvl7pPr marL="2743200" algn="l" defTabSz="914400" rtl="0" eaLnBrk="1" latinLnBrk="0" hangingPunct="1">
+      <a:defRPr sz="1200" kern="1200">
+        <a:solidFill>
+          <a:schemeClr val="tx1"/>
+        </a:solidFill>
+        <a:latin typeface="+mn-lt"/>
+        <a:ea typeface="+mn-ea"/>
+        <a:cs typeface="+mn-cs"/>
+      </a:defRPr>
+    </a:lvl7pPr>
+    <a:lvl8pPr marL="3200400" algn="l" defTabSz="914400" rtl="0" eaLnBrk="1" latinLnBrk="0" hangingPunct="1">
+      <a:defRPr sz="1200" kern="1200">
+        <a:solidFill>
+          <a:schemeClr val="tx1"/>
+        </a:solidFill>
+        <a:latin typeface="+mn-lt"/>
+        <a:ea typeface="+mn-ea"/>
+        <a:cs typeface="+mn-cs"/>
+      </a:defRPr>
+    </a:lvl8pPr>
+    <a:lvl9pPr marL="3657600" algn="l" defTabSz="914400" rtl="0" eaLnBrk="1" latinLnBrk="0" hangingPunct="1">
+      <a:defRPr sz="1200" kern="1200">
+        <a:solidFill>
+          <a:schemeClr val="tx1"/>
+        </a:solidFill>
+        <a:latin typeface="+mn-lt"/>
+        <a:ea typeface="+mn-ea"/>
+        <a:cs typeface="+mn-cs"/>
+      </a:defRPr>
+    </a:lvl9pPr>
+  </p:notesStyle>
+</p:notesMaster>
+</file>
+
+<file path=ppt/notesSlides/notesSlide1.xml><?xml version="1.0" encoding="utf-8"?>
+<p:notes xmlns:a="http://schemas.openxmlformats.org/drawingml/2006/main" xmlns:r="http://schemas.openxmlformats.org/officeDocument/2006/relationships" xmlns:p="http://schemas.openxmlformats.org/presentationml/2006/main">
+  <p:cSld>
+    <p:spTree>
+      <p:nvGrpSpPr>
+        <p:cNvPr id="1" name=""/>
+        <p:cNvGrpSpPr/>
+        <p:nvPr/>
+      </p:nvGrpSpPr>
+      <p:grpSpPr>
+        <a:xfrm>
+          <a:off x="0" y="0"/>
+          <a:ext cx="0" cy="0"/>
+          <a:chOff x="0" y="0"/>
+          <a:chExt cx="0" cy="0"/>
+        </a:xfrm>
+      </p:grpSpPr>
+      <p:sp>
+        <p:nvSpPr>
+          <p:cNvPr id="2" name="Slide Image Placeholder 1"/>
+          <p:cNvSpPr>
+            <a:spLocks noGrp="1" noRot="1" noChangeAspect="1"/>
+          </p:cNvSpPr>
+          <p:nvPr>
+            <p:ph type="sldImg"/>
+          </p:nvPr>
+        </p:nvSpPr>
+        <p:spPr/>
+      </p:sp>
+      <p:sp>
+        <p:nvSpPr>
+          <p:cNvPr id="3" name="Notes Placeholder 2"/>
+          <p:cNvSpPr>
+            <a:spLocks noGrp="1"/>
+          </p:cNvSpPr>
+          <p:nvPr>
+            <p:ph type="body" idx="1"/>
+          </p:nvPr>
+        </p:nvSpPr>
+        <p:spPr/>
+        <p:txBody>
+          <a:bodyPr/>
+          <a:lstStyle/>
+          <a:p>
+            <a:r>
+              <a:rPr lang="en-GB" dirty="0"/>
+              <a:t>Starting with my approach to the project and the specification – I started by looking through the requirements document and then looking through the code provided in the IMS starter. This gave me a good idea of the level of work required and the complexity involved. I then put my user-stories on to my JIRA, added planned out tasks – matching them with these user-stories where possible.</a:t>
+            </a:r>
+          </a:p>
+          <a:p>
+            <a:br>
+              <a:rPr lang="en-GB" dirty="0"/>
+            </a:br>
+            <a:r>
+              <a:rPr lang="en-GB" dirty="0"/>
+              <a:t>I then planned out which tasks to complete first – starting with the Items table, since it as similar to Customer, so working on it would get me used to the functionality of the code. I also figured it would be required by an Orders table.</a:t>
+            </a:r>
+          </a:p>
+        </p:txBody>
+      </p:sp>
+      <p:sp>
+        <p:nvSpPr>
+          <p:cNvPr id="4" name="Slide Number Placeholder 3"/>
+          <p:cNvSpPr>
+            <a:spLocks noGrp="1"/>
+          </p:cNvSpPr>
+          <p:nvPr>
+            <p:ph type="sldNum" sz="quarter" idx="5"/>
+          </p:nvPr>
+        </p:nvSpPr>
+        <p:spPr/>
+        <p:txBody>
+          <a:bodyPr/>
+          <a:lstStyle/>
+          <a:p>
+            <a:fld id="{5DCBFF80-3A6B-480D-8452-6B1BD2B3F655}" type="slidenum">
+              <a:rPr lang="en-GB" smtClean="0"/>
+              <a:t>2</a:t>
+            </a:fld>
+            <a:endParaRPr lang="en-GB"/>
+          </a:p>
+        </p:txBody>
+      </p:sp>
+    </p:spTree>
+    <p:extLst>
+      <p:ext uri="{BB962C8B-B14F-4D97-AF65-F5344CB8AC3E}">
+        <p14:creationId xmlns:p14="http://schemas.microsoft.com/office/powerpoint/2010/main" val="1266729523"/>
+      </p:ext>
+    </p:extLst>
+  </p:cSld>
+  <p:clrMapOvr>
+    <a:masterClrMapping/>
+  </p:clrMapOvr>
+</p:notes>
+</file>
+
+<file path=ppt/notesSlides/notesSlide2.xml><?xml version="1.0" encoding="utf-8"?>
+<p:notes xmlns:a="http://schemas.openxmlformats.org/drawingml/2006/main" xmlns:r="http://schemas.openxmlformats.org/officeDocument/2006/relationships" xmlns:p="http://schemas.openxmlformats.org/presentationml/2006/main">
+  <p:cSld>
+    <p:spTree>
+      <p:nvGrpSpPr>
+        <p:cNvPr id="1" name=""/>
+        <p:cNvGrpSpPr/>
+        <p:nvPr/>
+      </p:nvGrpSpPr>
+      <p:grpSpPr>
+        <a:xfrm>
+          <a:off x="0" y="0"/>
+          <a:ext cx="0" cy="0"/>
+          <a:chOff x="0" y="0"/>
+          <a:chExt cx="0" cy="0"/>
+        </a:xfrm>
+      </p:grpSpPr>
+      <p:sp>
+        <p:nvSpPr>
+          <p:cNvPr id="2" name="Slide Image Placeholder 1"/>
+          <p:cNvSpPr>
+            <a:spLocks noGrp="1" noRot="1" noChangeAspect="1"/>
+          </p:cNvSpPr>
+          <p:nvPr>
+            <p:ph type="sldImg"/>
+          </p:nvPr>
+        </p:nvSpPr>
+        <p:spPr/>
+      </p:sp>
+      <p:sp>
+        <p:nvSpPr>
+          <p:cNvPr id="3" name="Notes Placeholder 2"/>
+          <p:cNvSpPr>
+            <a:spLocks noGrp="1"/>
+          </p:cNvSpPr>
+          <p:nvPr>
+            <p:ph type="body" idx="1"/>
+          </p:nvPr>
+        </p:nvSpPr>
+        <p:spPr/>
+        <p:txBody>
+          <a:bodyPr/>
+          <a:lstStyle/>
+          <a:p>
+            <a:r>
+              <a:rPr lang="en-GB" dirty="0"/>
+              <a:t>When I started this project, I already had some familiarity with Java and SQL, but I learned a lot about using Junit for testing and using Maven – the build tool for this project. I also learned a lot about managing and organising a project, including how to properly  manage  a git-repo in Enterprise style, and how to prioritise tasks using </a:t>
+            </a:r>
+            <a:r>
+              <a:rPr lang="en-GB" dirty="0" err="1"/>
+              <a:t>MoSCoW</a:t>
+            </a:r>
+            <a:r>
+              <a:rPr lang="en-GB" dirty="0"/>
+              <a:t> estimation.</a:t>
+            </a:r>
+          </a:p>
+        </p:txBody>
+      </p:sp>
+      <p:sp>
+        <p:nvSpPr>
+          <p:cNvPr id="4" name="Slide Number Placeholder 3"/>
+          <p:cNvSpPr>
+            <a:spLocks noGrp="1"/>
+          </p:cNvSpPr>
+          <p:nvPr>
+            <p:ph type="sldNum" sz="quarter" idx="5"/>
+          </p:nvPr>
+        </p:nvSpPr>
+        <p:spPr/>
+        <p:txBody>
+          <a:bodyPr/>
+          <a:lstStyle/>
+          <a:p>
+            <a:fld id="{5DCBFF80-3A6B-480D-8452-6B1BD2B3F655}" type="slidenum">
+              <a:rPr lang="en-GB" smtClean="0"/>
+              <a:t>3</a:t>
+            </a:fld>
+            <a:endParaRPr lang="en-GB"/>
+          </a:p>
+        </p:txBody>
+      </p:sp>
+    </p:spTree>
+    <p:extLst>
+      <p:ext uri="{BB962C8B-B14F-4D97-AF65-F5344CB8AC3E}">
+        <p14:creationId xmlns:p14="http://schemas.microsoft.com/office/powerpoint/2010/main" val="262471513"/>
+      </p:ext>
+    </p:extLst>
+  </p:cSld>
+  <p:clrMapOvr>
+    <a:masterClrMapping/>
+  </p:clrMapOvr>
+</p:notes>
+</file>
+
+<file path=ppt/notesSlides/notesSlide3.xml><?xml version="1.0" encoding="utf-8"?>
+<p:notes xmlns:a="http://schemas.openxmlformats.org/drawingml/2006/main" xmlns:r="http://schemas.openxmlformats.org/officeDocument/2006/relationships" xmlns:p="http://schemas.openxmlformats.org/presentationml/2006/main">
+  <p:cSld>
+    <p:spTree>
+      <p:nvGrpSpPr>
+        <p:cNvPr id="1" name=""/>
+        <p:cNvGrpSpPr/>
+        <p:nvPr/>
+      </p:nvGrpSpPr>
+      <p:grpSpPr>
+        <a:xfrm>
+          <a:off x="0" y="0"/>
+          <a:ext cx="0" cy="0"/>
+          <a:chOff x="0" y="0"/>
+          <a:chExt cx="0" cy="0"/>
+        </a:xfrm>
+      </p:grpSpPr>
+      <p:sp>
+        <p:nvSpPr>
+          <p:cNvPr id="2" name="Slide Image Placeholder 1"/>
+          <p:cNvSpPr>
+            <a:spLocks noGrp="1" noRot="1" noChangeAspect="1"/>
+          </p:cNvSpPr>
+          <p:nvPr>
+            <p:ph type="sldImg"/>
+          </p:nvPr>
+        </p:nvSpPr>
+        <p:spPr/>
+      </p:sp>
+      <p:sp>
+        <p:nvSpPr>
+          <p:cNvPr id="3" name="Notes Placeholder 2"/>
+          <p:cNvSpPr>
+            <a:spLocks noGrp="1"/>
+          </p:cNvSpPr>
+          <p:nvPr>
+            <p:ph type="body" idx="1"/>
+          </p:nvPr>
+        </p:nvSpPr>
+        <p:spPr/>
+        <p:txBody>
+          <a:bodyPr/>
+          <a:lstStyle/>
+          <a:p>
+            <a:r>
+              <a:rPr lang="en-GB" dirty="0"/>
+              <a:t>As mentioned, I learned a lot about properly organising a git-repo. For this project, I started with forking from the IMS Starter, and made sure to follow the dev/feature branch model set-out. So I completed most of my work in the dev branch, using feature branches as I worked on elements of the project like adding Items or Orders functionality. I also used ‘test’ branches when I was writing out test code.</a:t>
+            </a:r>
+          </a:p>
+          <a:p>
+            <a:endParaRPr lang="en-GB" dirty="0"/>
+          </a:p>
+          <a:p>
+            <a:r>
+              <a:rPr lang="en-GB" dirty="0"/>
+              <a:t>In addition to this, I also created a hot-fix branch after my first merge from dev to master, after realising I’d missed a problem with the Order CRUD functionality. </a:t>
+            </a:r>
+          </a:p>
+          <a:p>
+            <a:endParaRPr lang="en-GB" dirty="0"/>
+          </a:p>
+          <a:p>
+            <a:r>
+              <a:rPr lang="en-GB" dirty="0"/>
+              <a:t>When I did have working code to be pushed to master, I pushed these as Versions, using semantic versioning – you can see the ‘release’ on my git-page is marked as 1.1.1</a:t>
+            </a:r>
+          </a:p>
+        </p:txBody>
+      </p:sp>
+      <p:sp>
+        <p:nvSpPr>
+          <p:cNvPr id="4" name="Slide Number Placeholder 3"/>
+          <p:cNvSpPr>
+            <a:spLocks noGrp="1"/>
+          </p:cNvSpPr>
+          <p:nvPr>
+            <p:ph type="sldNum" sz="quarter" idx="5"/>
+          </p:nvPr>
+        </p:nvSpPr>
+        <p:spPr/>
+        <p:txBody>
+          <a:bodyPr/>
+          <a:lstStyle/>
+          <a:p>
+            <a:fld id="{5DCBFF80-3A6B-480D-8452-6B1BD2B3F655}" type="slidenum">
+              <a:rPr lang="en-GB" smtClean="0"/>
+              <a:t>4</a:t>
+            </a:fld>
+            <a:endParaRPr lang="en-GB"/>
+          </a:p>
+        </p:txBody>
+      </p:sp>
+    </p:spTree>
+    <p:extLst>
+      <p:ext uri="{BB962C8B-B14F-4D97-AF65-F5344CB8AC3E}">
+        <p14:creationId xmlns:p14="http://schemas.microsoft.com/office/powerpoint/2010/main" val="1087713828"/>
+      </p:ext>
+    </p:extLst>
+  </p:cSld>
+  <p:clrMapOvr>
+    <a:masterClrMapping/>
+  </p:clrMapOvr>
+</p:notes>
+</file>
+
+<file path=ppt/notesSlides/notesSlide4.xml><?xml version="1.0" encoding="utf-8"?>
+<p:notes xmlns:a="http://schemas.openxmlformats.org/drawingml/2006/main" xmlns:r="http://schemas.openxmlformats.org/officeDocument/2006/relationships" xmlns:p="http://schemas.openxmlformats.org/presentationml/2006/main">
+  <p:cSld>
+    <p:spTree>
+      <p:nvGrpSpPr>
+        <p:cNvPr id="1" name=""/>
+        <p:cNvGrpSpPr/>
+        <p:nvPr/>
+      </p:nvGrpSpPr>
+      <p:grpSpPr>
+        <a:xfrm>
+          <a:off x="0" y="0"/>
+          <a:ext cx="0" cy="0"/>
+          <a:chOff x="0" y="0"/>
+          <a:chExt cx="0" cy="0"/>
+        </a:xfrm>
+      </p:grpSpPr>
+      <p:sp>
+        <p:nvSpPr>
+          <p:cNvPr id="2" name="Slide Image Placeholder 1"/>
+          <p:cNvSpPr>
+            <a:spLocks noGrp="1" noRot="1" noChangeAspect="1"/>
+          </p:cNvSpPr>
+          <p:nvPr>
+            <p:ph type="sldImg"/>
+          </p:nvPr>
+        </p:nvSpPr>
+        <p:spPr/>
+      </p:sp>
+      <p:sp>
+        <p:nvSpPr>
+          <p:cNvPr id="3" name="Notes Placeholder 2"/>
+          <p:cNvSpPr>
+            <a:spLocks noGrp="1"/>
+          </p:cNvSpPr>
+          <p:nvPr>
+            <p:ph type="body" idx="1"/>
+          </p:nvPr>
+        </p:nvSpPr>
+        <p:spPr/>
+        <p:txBody>
+          <a:bodyPr/>
+          <a:lstStyle/>
+          <a:p>
+            <a:r>
+              <a:rPr lang="en-GB" dirty="0"/>
+              <a:t>Moving on to testing my project, I achieved around 66% coverage, most of which is done using JUnit. There is some Mockito code for testing the Customer controller, which I was able to replicate for the Item controller – but not for the Order / Order-Item controllers as they are a bit more complex and we have not yet covered Mockito. </a:t>
+            </a:r>
+          </a:p>
+          <a:p>
+            <a:endParaRPr lang="en-GB" dirty="0"/>
+          </a:p>
+          <a:p>
+            <a:r>
+              <a:rPr lang="en-GB" dirty="0"/>
+              <a:t>The testing did come in useful, as I had not properly written out the </a:t>
+            </a:r>
+            <a:r>
+              <a:rPr lang="en-GB" dirty="0" err="1"/>
+              <a:t>HashCode</a:t>
+            </a:r>
+            <a:r>
+              <a:rPr lang="en-GB" dirty="0"/>
+              <a:t> for my order class, which caused problems when using a HashMap later – I was able to diagnose and fix the problem thanks to the tests.</a:t>
+            </a:r>
+          </a:p>
+          <a:p>
+            <a:endParaRPr lang="en-GB" dirty="0"/>
+          </a:p>
+          <a:p>
+            <a:r>
+              <a:rPr lang="en-GB" dirty="0"/>
+              <a:t>Some of the lacking coverage is with the Controllers, as I said, we haven’t covered Mockito. There is also some missing Junit tests for the Domain classes, as shown, since they are Enumerator classes and I wasn’t sure how to test / whether it was necessary to test them since they don’t contain any complex methods. </a:t>
+            </a:r>
+          </a:p>
+          <a:p>
+            <a:r>
+              <a:rPr lang="en-GB" dirty="0"/>
+              <a:t>A lot of the DAO classes are also missing some coverage in the “catch” segments, where they simply report to the user the nature of the error. I wasn’t sure how to test for catching of exceptions and even if I did, the code tested in the catch is print statements.</a:t>
+            </a:r>
+          </a:p>
+        </p:txBody>
+      </p:sp>
+      <p:sp>
+        <p:nvSpPr>
+          <p:cNvPr id="4" name="Slide Number Placeholder 3"/>
+          <p:cNvSpPr>
+            <a:spLocks noGrp="1"/>
+          </p:cNvSpPr>
+          <p:nvPr>
+            <p:ph type="sldNum" sz="quarter" idx="5"/>
+          </p:nvPr>
+        </p:nvSpPr>
+        <p:spPr/>
+        <p:txBody>
+          <a:bodyPr/>
+          <a:lstStyle/>
+          <a:p>
+            <a:fld id="{5DCBFF80-3A6B-480D-8452-6B1BD2B3F655}" type="slidenum">
+              <a:rPr lang="en-GB" smtClean="0"/>
+              <a:t>5</a:t>
+            </a:fld>
+            <a:endParaRPr lang="en-GB"/>
+          </a:p>
+        </p:txBody>
+      </p:sp>
+    </p:spTree>
+    <p:extLst>
+      <p:ext uri="{BB962C8B-B14F-4D97-AF65-F5344CB8AC3E}">
+        <p14:creationId xmlns:p14="http://schemas.microsoft.com/office/powerpoint/2010/main" val="2135172519"/>
+      </p:ext>
+    </p:extLst>
+  </p:cSld>
+  <p:clrMapOvr>
+    <a:masterClrMapping/>
+  </p:clrMapOvr>
+</p:notes>
+</file>
+
+<file path=ppt/notesSlides/notesSlide5.xml><?xml version="1.0" encoding="utf-8"?>
+<p:notes xmlns:a="http://schemas.openxmlformats.org/drawingml/2006/main" xmlns:r="http://schemas.openxmlformats.org/officeDocument/2006/relationships" xmlns:p="http://schemas.openxmlformats.org/presentationml/2006/main">
+  <p:cSld>
+    <p:spTree>
+      <p:nvGrpSpPr>
+        <p:cNvPr id="1" name=""/>
+        <p:cNvGrpSpPr/>
+        <p:nvPr/>
+      </p:nvGrpSpPr>
+      <p:grpSpPr>
+        <a:xfrm>
+          <a:off x="0" y="0"/>
+          <a:ext cx="0" cy="0"/>
+          <a:chOff x="0" y="0"/>
+          <a:chExt cx="0" cy="0"/>
+        </a:xfrm>
+      </p:grpSpPr>
+      <p:sp>
+        <p:nvSpPr>
+          <p:cNvPr id="2" name="Slide Image Placeholder 1"/>
+          <p:cNvSpPr>
+            <a:spLocks noGrp="1" noRot="1" noChangeAspect="1"/>
+          </p:cNvSpPr>
+          <p:nvPr>
+            <p:ph type="sldImg"/>
+          </p:nvPr>
+        </p:nvSpPr>
+        <p:spPr/>
+      </p:sp>
+      <p:sp>
+        <p:nvSpPr>
+          <p:cNvPr id="3" name="Notes Placeholder 2"/>
+          <p:cNvSpPr>
+            <a:spLocks noGrp="1"/>
+          </p:cNvSpPr>
+          <p:nvPr>
+            <p:ph type="body" idx="1"/>
+          </p:nvPr>
+        </p:nvSpPr>
+        <p:spPr/>
+        <p:txBody>
+          <a:bodyPr/>
+          <a:lstStyle/>
+          <a:p>
+            <a:r>
+              <a:rPr lang="en-GB" dirty="0"/>
+              <a:t>Before I demo, I just want to walk you through my project operational structure. On the left, shown is how the user performs operations through the Command-Line interface. The Customer and Items behave the same. Orders are done differently – with Read, Create and Delete being the same, however Update branches into update-details (behaves like Items, Customers) or to update Order-Items which leads to another CRUD menu.</a:t>
+            </a:r>
+          </a:p>
+          <a:p>
+            <a:endParaRPr lang="en-GB" dirty="0"/>
+          </a:p>
+          <a:p>
+            <a:r>
+              <a:rPr lang="en-GB" dirty="0"/>
+              <a:t>On the right is my Entity-Relationship diagram. </a:t>
+            </a:r>
+          </a:p>
+        </p:txBody>
+      </p:sp>
+      <p:sp>
+        <p:nvSpPr>
+          <p:cNvPr id="4" name="Slide Number Placeholder 3"/>
+          <p:cNvSpPr>
+            <a:spLocks noGrp="1"/>
+          </p:cNvSpPr>
+          <p:nvPr>
+            <p:ph type="sldNum" sz="quarter" idx="5"/>
+          </p:nvPr>
+        </p:nvSpPr>
+        <p:spPr/>
+        <p:txBody>
+          <a:bodyPr/>
+          <a:lstStyle/>
+          <a:p>
+            <a:fld id="{5DCBFF80-3A6B-480D-8452-6B1BD2B3F655}" type="slidenum">
+              <a:rPr lang="en-GB" smtClean="0"/>
+              <a:t>6</a:t>
+            </a:fld>
+            <a:endParaRPr lang="en-GB"/>
+          </a:p>
+        </p:txBody>
+      </p:sp>
+    </p:spTree>
+    <p:extLst>
+      <p:ext uri="{BB962C8B-B14F-4D97-AF65-F5344CB8AC3E}">
+        <p14:creationId xmlns:p14="http://schemas.microsoft.com/office/powerpoint/2010/main" val="3038847635"/>
+      </p:ext>
+    </p:extLst>
+  </p:cSld>
+  <p:clrMapOvr>
+    <a:masterClrMapping/>
+  </p:clrMapOvr>
+</p:notes>
+</file>
+
+<file path=ppt/notesSlides/notesSlide6.xml><?xml version="1.0" encoding="utf-8"?>
+<p:notes xmlns:a="http://schemas.openxmlformats.org/drawingml/2006/main" xmlns:r="http://schemas.openxmlformats.org/officeDocument/2006/relationships" xmlns:p="http://schemas.openxmlformats.org/presentationml/2006/main">
+  <p:cSld>
+    <p:spTree>
+      <p:nvGrpSpPr>
+        <p:cNvPr id="1" name=""/>
+        <p:cNvGrpSpPr/>
+        <p:nvPr/>
+      </p:nvGrpSpPr>
+      <p:grpSpPr>
+        <a:xfrm>
+          <a:off x="0" y="0"/>
+          <a:ext cx="0" cy="0"/>
+          <a:chOff x="0" y="0"/>
+          <a:chExt cx="0" cy="0"/>
+        </a:xfrm>
+      </p:grpSpPr>
+      <p:sp>
+        <p:nvSpPr>
+          <p:cNvPr id="2" name="Slide Image Placeholder 1"/>
+          <p:cNvSpPr>
+            <a:spLocks noGrp="1" noRot="1" noChangeAspect="1"/>
+          </p:cNvSpPr>
+          <p:nvPr>
+            <p:ph type="sldImg"/>
+          </p:nvPr>
+        </p:nvSpPr>
+        <p:spPr/>
+      </p:sp>
+      <p:sp>
+        <p:nvSpPr>
+          <p:cNvPr id="3" name="Notes Placeholder 2"/>
+          <p:cNvSpPr>
+            <a:spLocks noGrp="1"/>
+          </p:cNvSpPr>
+          <p:nvPr>
+            <p:ph type="body" idx="1"/>
+          </p:nvPr>
+        </p:nvSpPr>
+        <p:spPr/>
+        <p:txBody>
+          <a:bodyPr/>
+          <a:lstStyle/>
+          <a:p>
+            <a:r>
+              <a:rPr lang="en-GB" dirty="0"/>
+              <a:t>In my sprint, I achieved all the tasks tagged with ‘Must’ and ‘Should’, as well as a number of those tagged as ‘could’.</a:t>
+            </a:r>
+          </a:p>
+          <a:p>
+            <a:r>
+              <a:rPr lang="en-GB" dirty="0"/>
+              <a:t>This includes all the Customer and Item operations specified, as well as a majority of the order operations.</a:t>
+            </a:r>
+          </a:p>
+          <a:p>
+            <a:r>
+              <a:rPr lang="en-GB" dirty="0"/>
+              <a:t>A couple of tasks / stories were returned to the backlog, including setting up a GCP connection – after being told it was no-longer necessary, and tasks related to user login, as this was not a minimum requirement.</a:t>
+            </a:r>
+          </a:p>
+        </p:txBody>
+      </p:sp>
+      <p:sp>
+        <p:nvSpPr>
+          <p:cNvPr id="4" name="Slide Number Placeholder 3"/>
+          <p:cNvSpPr>
+            <a:spLocks noGrp="1"/>
+          </p:cNvSpPr>
+          <p:nvPr>
+            <p:ph type="sldNum" sz="quarter" idx="5"/>
+          </p:nvPr>
+        </p:nvSpPr>
+        <p:spPr/>
+        <p:txBody>
+          <a:bodyPr/>
+          <a:lstStyle/>
+          <a:p>
+            <a:fld id="{5DCBFF80-3A6B-480D-8452-6B1BD2B3F655}" type="slidenum">
+              <a:rPr lang="en-GB" smtClean="0"/>
+              <a:t>8</a:t>
+            </a:fld>
+            <a:endParaRPr lang="en-GB"/>
+          </a:p>
+        </p:txBody>
+      </p:sp>
+    </p:spTree>
+    <p:extLst>
+      <p:ext uri="{BB962C8B-B14F-4D97-AF65-F5344CB8AC3E}">
+        <p14:creationId xmlns:p14="http://schemas.microsoft.com/office/powerpoint/2010/main" val="3266477984"/>
+      </p:ext>
+    </p:extLst>
+  </p:cSld>
+  <p:clrMapOvr>
+    <a:masterClrMapping/>
+  </p:clrMapOvr>
+</p:notes>
+</file>
+
+<file path=ppt/notesSlides/notesSlide7.xml><?xml version="1.0" encoding="utf-8"?>
+<p:notes xmlns:a="http://schemas.openxmlformats.org/drawingml/2006/main" xmlns:r="http://schemas.openxmlformats.org/officeDocument/2006/relationships" xmlns:p="http://schemas.openxmlformats.org/presentationml/2006/main">
+  <p:cSld>
+    <p:spTree>
+      <p:nvGrpSpPr>
+        <p:cNvPr id="1" name=""/>
+        <p:cNvGrpSpPr/>
+        <p:nvPr/>
+      </p:nvGrpSpPr>
+      <p:grpSpPr>
+        <a:xfrm>
+          <a:off x="0" y="0"/>
+          <a:ext cx="0" cy="0"/>
+          <a:chOff x="0" y="0"/>
+          <a:chExt cx="0" cy="0"/>
+        </a:xfrm>
+      </p:grpSpPr>
+      <p:sp>
+        <p:nvSpPr>
+          <p:cNvPr id="2" name="Slide Image Placeholder 1"/>
+          <p:cNvSpPr>
+            <a:spLocks noGrp="1" noRot="1" noChangeAspect="1"/>
+          </p:cNvSpPr>
+          <p:nvPr>
+            <p:ph type="sldImg"/>
+          </p:nvPr>
+        </p:nvSpPr>
+        <p:spPr/>
+      </p:sp>
+      <p:sp>
+        <p:nvSpPr>
+          <p:cNvPr id="3" name="Notes Placeholder 2"/>
+          <p:cNvSpPr>
+            <a:spLocks noGrp="1"/>
+          </p:cNvSpPr>
+          <p:nvPr>
+            <p:ph type="body" idx="1"/>
+          </p:nvPr>
+        </p:nvSpPr>
+        <p:spPr/>
+        <p:txBody>
+          <a:bodyPr/>
+          <a:lstStyle/>
+          <a:p>
+            <a:r>
+              <a:rPr lang="en-GB" dirty="0"/>
+              <a:t>Reflecting on this sprint, I am pleased that my project bears some semblance to what I planned – the classes I thought would be there exist in some form, my database schema has remained largely the same. I feel my prioritisation of tasks worked well, helping me get quickly up to speed with the way the code works and enabling me to write my own and make changes that I understood the consequences of.</a:t>
+            </a:r>
+          </a:p>
+          <a:p>
+            <a:endParaRPr lang="en-GB" dirty="0"/>
+          </a:p>
+          <a:p>
+            <a:r>
+              <a:rPr lang="en-GB" dirty="0"/>
+              <a:t>I think I could do much better in terms of user-story coverage, as well as story-points. I could also have a more detailed break-down of tasks, i.e. instead of having “make the Item-Controller” I could have had “Make the controller create method”… and so on.</a:t>
+            </a:r>
+          </a:p>
+        </p:txBody>
+      </p:sp>
+      <p:sp>
+        <p:nvSpPr>
+          <p:cNvPr id="4" name="Slide Number Placeholder 3"/>
+          <p:cNvSpPr>
+            <a:spLocks noGrp="1"/>
+          </p:cNvSpPr>
+          <p:nvPr>
+            <p:ph type="sldNum" sz="quarter" idx="5"/>
+          </p:nvPr>
+        </p:nvSpPr>
+        <p:spPr/>
+        <p:txBody>
+          <a:bodyPr/>
+          <a:lstStyle/>
+          <a:p>
+            <a:fld id="{5DCBFF80-3A6B-480D-8452-6B1BD2B3F655}" type="slidenum">
+              <a:rPr lang="en-GB" smtClean="0"/>
+              <a:t>9</a:t>
+            </a:fld>
+            <a:endParaRPr lang="en-GB"/>
+          </a:p>
+        </p:txBody>
+      </p:sp>
+    </p:spTree>
+    <p:extLst>
+      <p:ext uri="{BB962C8B-B14F-4D97-AF65-F5344CB8AC3E}">
+        <p14:creationId xmlns:p14="http://schemas.microsoft.com/office/powerpoint/2010/main" val="960113329"/>
+      </p:ext>
+    </p:extLst>
+  </p:cSld>
+  <p:clrMapOvr>
+    <a:masterClrMapping/>
+  </p:clrMapOvr>
+</p:notes>
 </file>
 
 <file path=ppt/slideLayouts/slideLayout1.xml><?xml version="1.0" encoding="utf-8"?>
@@ -6814,7 +7873,7 @@
           <p:nvPr/>
         </p:nvPicPr>
         <p:blipFill>
-          <a:blip r:embed="rId2"/>
+          <a:blip r:embed="rId3"/>
           <a:stretch>
             <a:fillRect/>
           </a:stretch>
@@ -6860,7 +7919,7 @@
           </p:nvPr>
         </p:nvPicPr>
         <p:blipFill rotWithShape="1">
-          <a:blip r:embed="rId3">
+          <a:blip r:embed="rId4">
             <a:extLst>
               <a:ext uri="{28A0092B-C50C-407E-A947-70E740481C1C}">
                 <a14:useLocalDpi xmlns:a14="http://schemas.microsoft.com/office/drawing/2010/main" val="0"/>
@@ -6913,7 +7972,7 @@
     <p:bg>
       <p:bgPr>
         <a:blipFill rotWithShape="1">
-          <a:blip r:embed="rId2">
+          <a:blip r:embed="rId3">
             <a:duotone>
               <a:schemeClr val="bg2">
                 <a:shade val="69000"/>
@@ -6971,7 +8030,7 @@
           </p:nvPr>
         </p:nvPicPr>
         <p:blipFill rotWithShape="1">
-          <a:blip r:embed="rId3">
+          <a:blip r:embed="rId4">
             <a:extLst>
               <a:ext uri="{28A0092B-C50C-407E-A947-70E740481C1C}">
                 <a14:useLocalDpi xmlns:a14="http://schemas.microsoft.com/office/drawing/2010/main" val="0"/>
@@ -7015,7 +8074,7 @@
           </p:nvPr>
         </p:nvPicPr>
         <p:blipFill rotWithShape="1">
-          <a:blip r:embed="rId4">
+          <a:blip r:embed="rId5">
             <a:extLst>
               <a:ext uri="{28A0092B-C50C-407E-A947-70E740481C1C}">
                 <a14:useLocalDpi xmlns:a14="http://schemas.microsoft.com/office/drawing/2010/main" val="0"/>
@@ -7133,7 +8192,7 @@
           </p:nvPr>
         </p:nvPicPr>
         <p:blipFill rotWithShape="1">
-          <a:blip r:embed="rId5">
+          <a:blip r:embed="rId6">
             <a:extLst>
               <a:ext uri="{28A0092B-C50C-407E-A947-70E740481C1C}">
                 <a14:useLocalDpi xmlns:a14="http://schemas.microsoft.com/office/drawing/2010/main" val="0"/>
@@ -7177,7 +8236,7 @@
           </p:nvPr>
         </p:nvPicPr>
         <p:blipFill rotWithShape="1">
-          <a:blip r:embed="rId6">
+          <a:blip r:embed="rId7">
             <a:extLst>
               <a:ext uri="{28A0092B-C50C-407E-A947-70E740481C1C}">
                 <a14:useLocalDpi xmlns:a14="http://schemas.microsoft.com/office/drawing/2010/main" val="0"/>
@@ -7302,7 +8361,7 @@
           </p:nvPr>
         </p:nvPicPr>
         <p:blipFill rotWithShape="1">
-          <a:blip r:embed="rId7">
+          <a:blip r:embed="rId8">
             <a:extLst>
               <a:ext uri="{28A0092B-C50C-407E-A947-70E740481C1C}">
                 <a14:useLocalDpi xmlns:a14="http://schemas.microsoft.com/office/drawing/2010/main" val="0"/>
@@ -7702,292 +8761,6 @@
           </a:p>
         </p:txBody>
       </p:sp>
-      <p:sp>
-        <p:nvSpPr>
-          <p:cNvPr id="12" name="Content Placeholder 3">
-            <a:extLst>
-              <a:ext uri="{FF2B5EF4-FFF2-40B4-BE49-F238E27FC236}">
-                <a16:creationId xmlns:a16="http://schemas.microsoft.com/office/drawing/2014/main" id="{D7420E5C-831D-40B7-9865-6D2BD51506F9}"/>
-              </a:ext>
-            </a:extLst>
-          </p:cNvPr>
-          <p:cNvSpPr txBox="1">
-            <a:spLocks/>
-          </p:cNvSpPr>
-          <p:nvPr/>
-        </p:nvSpPr>
-        <p:spPr>
-          <a:xfrm>
-            <a:off x="8609012" y="2425500"/>
-            <a:ext cx="3322523" cy="2178828"/>
-          </a:xfrm>
-          <a:prstGeom prst="rect">
-            <a:avLst/>
-          </a:prstGeom>
-        </p:spPr>
-        <p:txBody>
-          <a:bodyPr vert="horz" lIns="91440" tIns="45720" rIns="91440" bIns="45720" rtlCol="0">
-            <a:normAutofit/>
-          </a:bodyPr>
-          <a:lstStyle>
-            <a:lvl1pPr marL="342900" indent="-342900" algn="l" defTabSz="457200" rtl="0" eaLnBrk="1" latinLnBrk="0" hangingPunct="1">
-              <a:spcBef>
-                <a:spcPts val="1000"/>
-              </a:spcBef>
-              <a:spcAft>
-                <a:spcPts val="0"/>
-              </a:spcAft>
-              <a:buClr>
-                <a:schemeClr val="accent1">
-                  <a:lumMod val="60000"/>
-                  <a:lumOff val="40000"/>
-                </a:schemeClr>
-              </a:buClr>
-              <a:buSzPct val="80000"/>
-              <a:buFont typeface="Wingdings 3" charset="2"/>
-              <a:buChar char=""/>
-              <a:defRPr sz="1800" b="0" i="0" kern="1200">
-                <a:solidFill>
-                  <a:schemeClr val="tx1"/>
-                </a:solidFill>
-                <a:latin typeface="+mj-lt"/>
-                <a:ea typeface="+mj-ea"/>
-                <a:cs typeface="+mj-cs"/>
-              </a:defRPr>
-            </a:lvl1pPr>
-            <a:lvl2pPr marL="742950" indent="-285750" algn="l" defTabSz="457200" rtl="0" eaLnBrk="1" latinLnBrk="0" hangingPunct="1">
-              <a:spcBef>
-                <a:spcPts val="1000"/>
-              </a:spcBef>
-              <a:spcAft>
-                <a:spcPts val="0"/>
-              </a:spcAft>
-              <a:buClr>
-                <a:schemeClr val="accent1">
-                  <a:lumMod val="60000"/>
-                  <a:lumOff val="40000"/>
-                </a:schemeClr>
-              </a:buClr>
-              <a:buSzPct val="80000"/>
-              <a:buFont typeface="Wingdings 3" charset="2"/>
-              <a:buChar char=""/>
-              <a:defRPr sz="1600" b="0" i="0" kern="1200">
-                <a:solidFill>
-                  <a:schemeClr val="tx1"/>
-                </a:solidFill>
-                <a:latin typeface="+mj-lt"/>
-                <a:ea typeface="+mj-ea"/>
-                <a:cs typeface="+mj-cs"/>
-              </a:defRPr>
-            </a:lvl2pPr>
-            <a:lvl3pPr marL="1143000" indent="-228600" algn="l" defTabSz="457200" rtl="0" eaLnBrk="1" latinLnBrk="0" hangingPunct="1">
-              <a:spcBef>
-                <a:spcPts val="1000"/>
-              </a:spcBef>
-              <a:spcAft>
-                <a:spcPts val="0"/>
-              </a:spcAft>
-              <a:buClr>
-                <a:schemeClr val="accent1">
-                  <a:lumMod val="60000"/>
-                  <a:lumOff val="40000"/>
-                </a:schemeClr>
-              </a:buClr>
-              <a:buSzPct val="80000"/>
-              <a:buFont typeface="Wingdings 3" charset="2"/>
-              <a:buChar char=""/>
-              <a:defRPr sz="1400" b="0" i="0" kern="1200">
-                <a:solidFill>
-                  <a:schemeClr val="tx1"/>
-                </a:solidFill>
-                <a:latin typeface="+mj-lt"/>
-                <a:ea typeface="+mj-ea"/>
-                <a:cs typeface="+mj-cs"/>
-              </a:defRPr>
-            </a:lvl3pPr>
-            <a:lvl4pPr marL="1600200" indent="-228600" algn="l" defTabSz="457200" rtl="0" eaLnBrk="1" latinLnBrk="0" hangingPunct="1">
-              <a:spcBef>
-                <a:spcPts val="1000"/>
-              </a:spcBef>
-              <a:spcAft>
-                <a:spcPts val="0"/>
-              </a:spcAft>
-              <a:buClr>
-                <a:schemeClr val="accent1">
-                  <a:lumMod val="60000"/>
-                  <a:lumOff val="40000"/>
-                </a:schemeClr>
-              </a:buClr>
-              <a:buSzPct val="80000"/>
-              <a:buFont typeface="Wingdings 3" charset="2"/>
-              <a:buChar char=""/>
-              <a:defRPr sz="1200" b="0" i="0" kern="1200">
-                <a:solidFill>
-                  <a:schemeClr val="tx1"/>
-                </a:solidFill>
-                <a:latin typeface="+mj-lt"/>
-                <a:ea typeface="+mj-ea"/>
-                <a:cs typeface="+mj-cs"/>
-              </a:defRPr>
-            </a:lvl4pPr>
-            <a:lvl5pPr marL="2057400" indent="-228600" algn="l" defTabSz="457200" rtl="0" eaLnBrk="1" latinLnBrk="0" hangingPunct="1">
-              <a:spcBef>
-                <a:spcPts val="1000"/>
-              </a:spcBef>
-              <a:spcAft>
-                <a:spcPts val="0"/>
-              </a:spcAft>
-              <a:buClr>
-                <a:schemeClr val="accent1">
-                  <a:lumMod val="60000"/>
-                  <a:lumOff val="40000"/>
-                </a:schemeClr>
-              </a:buClr>
-              <a:buSzPct val="80000"/>
-              <a:buFont typeface="Wingdings 3" charset="2"/>
-              <a:buChar char=""/>
-              <a:defRPr sz="1200" b="0" i="0" kern="1200">
-                <a:solidFill>
-                  <a:schemeClr val="tx1"/>
-                </a:solidFill>
-                <a:latin typeface="+mj-lt"/>
-                <a:ea typeface="+mj-ea"/>
-                <a:cs typeface="+mj-cs"/>
-              </a:defRPr>
-            </a:lvl5pPr>
-            <a:lvl6pPr marL="2514600" indent="-228600" algn="l" defTabSz="457200" rtl="0" eaLnBrk="1" latinLnBrk="0" hangingPunct="1">
-              <a:spcBef>
-                <a:spcPts val="1000"/>
-              </a:spcBef>
-              <a:spcAft>
-                <a:spcPts val="0"/>
-              </a:spcAft>
-              <a:buClr>
-                <a:schemeClr val="accent1">
-                  <a:lumMod val="60000"/>
-                  <a:lumOff val="40000"/>
-                </a:schemeClr>
-              </a:buClr>
-              <a:buSzPct val="80000"/>
-              <a:buFont typeface="Wingdings 3" charset="2"/>
-              <a:buChar char=""/>
-              <a:defRPr sz="1200" b="0" i="0" kern="1200">
-                <a:solidFill>
-                  <a:schemeClr val="tx1"/>
-                </a:solidFill>
-                <a:latin typeface="+mj-lt"/>
-                <a:ea typeface="+mj-ea"/>
-                <a:cs typeface="+mj-cs"/>
-              </a:defRPr>
-            </a:lvl6pPr>
-            <a:lvl7pPr marL="2971800" indent="-228600" algn="l" defTabSz="457200" rtl="0" eaLnBrk="1" latinLnBrk="0" hangingPunct="1">
-              <a:spcBef>
-                <a:spcPts val="1000"/>
-              </a:spcBef>
-              <a:spcAft>
-                <a:spcPts val="0"/>
-              </a:spcAft>
-              <a:buClr>
-                <a:schemeClr val="accent1">
-                  <a:lumMod val="60000"/>
-                  <a:lumOff val="40000"/>
-                </a:schemeClr>
-              </a:buClr>
-              <a:buSzPct val="80000"/>
-              <a:buFont typeface="Wingdings 3" charset="2"/>
-              <a:buChar char=""/>
-              <a:defRPr sz="1200" b="0" i="0" kern="1200">
-                <a:solidFill>
-                  <a:schemeClr val="tx1"/>
-                </a:solidFill>
-                <a:latin typeface="+mj-lt"/>
-                <a:ea typeface="+mj-ea"/>
-                <a:cs typeface="+mj-cs"/>
-              </a:defRPr>
-            </a:lvl7pPr>
-            <a:lvl8pPr marL="3429000" indent="-228600" algn="l" defTabSz="457200" rtl="0" eaLnBrk="1" latinLnBrk="0" hangingPunct="1">
-              <a:spcBef>
-                <a:spcPts val="1000"/>
-              </a:spcBef>
-              <a:spcAft>
-                <a:spcPts val="0"/>
-              </a:spcAft>
-              <a:buClr>
-                <a:schemeClr val="accent1">
-                  <a:lumMod val="60000"/>
-                  <a:lumOff val="40000"/>
-                </a:schemeClr>
-              </a:buClr>
-              <a:buSzPct val="80000"/>
-              <a:buFont typeface="Wingdings 3" charset="2"/>
-              <a:buChar char=""/>
-              <a:defRPr sz="1200" b="0" i="0" kern="1200">
-                <a:solidFill>
-                  <a:schemeClr val="tx1"/>
-                </a:solidFill>
-                <a:latin typeface="+mj-lt"/>
-                <a:ea typeface="+mj-ea"/>
-                <a:cs typeface="+mj-cs"/>
-              </a:defRPr>
-            </a:lvl8pPr>
-            <a:lvl9pPr marL="3886200" indent="-228600" algn="l" defTabSz="457200" rtl="0" eaLnBrk="1" latinLnBrk="0" hangingPunct="1">
-              <a:spcBef>
-                <a:spcPts val="1000"/>
-              </a:spcBef>
-              <a:spcAft>
-                <a:spcPts val="0"/>
-              </a:spcAft>
-              <a:buClr>
-                <a:schemeClr val="accent1">
-                  <a:lumMod val="60000"/>
-                  <a:lumOff val="40000"/>
-                </a:schemeClr>
-              </a:buClr>
-              <a:buSzPct val="80000"/>
-              <a:buFont typeface="Wingdings 3" charset="2"/>
-              <a:buChar char=""/>
-              <a:defRPr sz="1200" b="0" i="0" kern="1200">
-                <a:solidFill>
-                  <a:schemeClr val="tx1"/>
-                </a:solidFill>
-                <a:latin typeface="+mj-lt"/>
-                <a:ea typeface="+mj-ea"/>
-                <a:cs typeface="+mj-cs"/>
-              </a:defRPr>
-            </a:lvl9pPr>
-          </a:lstStyle>
-          <a:p>
-            <a:pPr marL="0" indent="0">
-              <a:buFont typeface="Wingdings 3" charset="2"/>
-              <a:buNone/>
-            </a:pPr>
-            <a:endParaRPr lang="en-US" dirty="0"/>
-          </a:p>
-          <a:p>
-            <a:r>
-              <a:rPr lang="en-US" dirty="0"/>
-              <a:t>Cloud Technology</a:t>
-            </a:r>
-            <a:br>
-              <a:rPr lang="en-US" dirty="0"/>
-            </a:br>
-            <a:r>
-              <a:rPr lang="en-US" dirty="0" err="1"/>
-              <a:t>i.e</a:t>
-            </a:r>
-            <a:r>
-              <a:rPr lang="en-US" dirty="0"/>
-              <a:t>: GCP</a:t>
-            </a:r>
-          </a:p>
-          <a:p>
-            <a:endParaRPr lang="en-US" dirty="0"/>
-          </a:p>
-          <a:p>
-            <a:endParaRPr lang="en-US" dirty="0"/>
-          </a:p>
-        </p:txBody>
-      </p:sp>
       <p:pic>
         <p:nvPicPr>
           <p:cNvPr id="3" name="Picture 2">
@@ -8003,7 +8776,7 @@
           <p:nvPr/>
         </p:nvPicPr>
         <p:blipFill>
-          <a:blip r:embed="rId8"/>
+          <a:blip r:embed="rId9"/>
           <a:stretch>
             <a:fillRect/>
           </a:stretch>
@@ -8126,7 +8899,7 @@
     <p:bg>
       <p:bgPr>
         <a:blipFill rotWithShape="1">
-          <a:blip r:embed="rId2">
+          <a:blip r:embed="rId3">
             <a:duotone>
               <a:schemeClr val="bg2">
                 <a:shade val="69000"/>
@@ -8184,7 +8957,7 @@
           </p:nvPr>
         </p:nvPicPr>
         <p:blipFill rotWithShape="1">
-          <a:blip r:embed="rId3">
+          <a:blip r:embed="rId4">
             <a:extLst>
               <a:ext uri="{28A0092B-C50C-407E-A947-70E740481C1C}">
                 <a14:useLocalDpi xmlns:a14="http://schemas.microsoft.com/office/drawing/2010/main" val="0"/>
@@ -8228,7 +9001,7 @@
           </p:nvPr>
         </p:nvPicPr>
         <p:blipFill rotWithShape="1">
-          <a:blip r:embed="rId4">
+          <a:blip r:embed="rId5">
             <a:extLst>
               <a:ext uri="{28A0092B-C50C-407E-A947-70E740481C1C}">
                 <a14:useLocalDpi xmlns:a14="http://schemas.microsoft.com/office/drawing/2010/main" val="0"/>
@@ -8346,7 +9119,7 @@
           </p:nvPr>
         </p:nvPicPr>
         <p:blipFill rotWithShape="1">
-          <a:blip r:embed="rId5">
+          <a:blip r:embed="rId6">
             <a:extLst>
               <a:ext uri="{28A0092B-C50C-407E-A947-70E740481C1C}">
                 <a14:useLocalDpi xmlns:a14="http://schemas.microsoft.com/office/drawing/2010/main" val="0"/>
@@ -8390,7 +9163,7 @@
           </p:nvPr>
         </p:nvPicPr>
         <p:blipFill rotWithShape="1">
-          <a:blip r:embed="rId6">
+          <a:blip r:embed="rId7">
             <a:extLst>
               <a:ext uri="{28A0092B-C50C-407E-A947-70E740481C1C}">
                 <a14:useLocalDpi xmlns:a14="http://schemas.microsoft.com/office/drawing/2010/main" val="0"/>
@@ -9238,7 +10011,7 @@
       <p:pic>
         <p:nvPicPr>
           <p:cNvPr id="6" name="Content Placeholder 5">
-            <a:hlinkClick r:id="rId7"/>
+            <a:hlinkClick r:id="rId8"/>
             <a:extLst>
               <a:ext uri="{FF2B5EF4-FFF2-40B4-BE49-F238E27FC236}">
                 <a16:creationId xmlns:a16="http://schemas.microsoft.com/office/drawing/2014/main" id="{421E66BC-BACA-47E5-B98C-70532DE0AE8C}"/>
@@ -9253,7 +10026,7 @@
           </p:nvPr>
         </p:nvPicPr>
         <p:blipFill>
-          <a:blip r:embed="rId8"/>
+          <a:blip r:embed="rId9"/>
           <a:stretch>
             <a:fillRect/>
           </a:stretch>
@@ -9301,7 +10074,7 @@
     <p:bg>
       <p:bgPr>
         <a:blipFill rotWithShape="1">
-          <a:blip r:embed="rId2">
+          <a:blip r:embed="rId3">
             <a:duotone>
               <a:schemeClr val="bg2">
                 <a:shade val="69000"/>
@@ -9359,7 +10132,7 @@
           </p:nvPr>
         </p:nvPicPr>
         <p:blipFill rotWithShape="1">
-          <a:blip r:embed="rId3">
+          <a:blip r:embed="rId4">
             <a:extLst>
               <a:ext uri="{28A0092B-C50C-407E-A947-70E740481C1C}">
                 <a14:useLocalDpi xmlns:a14="http://schemas.microsoft.com/office/drawing/2010/main" val="0"/>
@@ -9403,7 +10176,7 @@
           </p:nvPr>
         </p:nvPicPr>
         <p:blipFill rotWithShape="1">
-          <a:blip r:embed="rId4">
+          <a:blip r:embed="rId5">
             <a:extLst>
               <a:ext uri="{28A0092B-C50C-407E-A947-70E740481C1C}">
                 <a14:useLocalDpi xmlns:a14="http://schemas.microsoft.com/office/drawing/2010/main" val="0"/>
@@ -9521,7 +10294,7 @@
           </p:nvPr>
         </p:nvPicPr>
         <p:blipFill rotWithShape="1">
-          <a:blip r:embed="rId5">
+          <a:blip r:embed="rId6">
             <a:extLst>
               <a:ext uri="{28A0092B-C50C-407E-A947-70E740481C1C}">
                 <a14:useLocalDpi xmlns:a14="http://schemas.microsoft.com/office/drawing/2010/main" val="0"/>
@@ -9565,7 +10338,7 @@
           </p:nvPr>
         </p:nvPicPr>
         <p:blipFill rotWithShape="1">
-          <a:blip r:embed="rId6">
+          <a:blip r:embed="rId7">
             <a:extLst>
               <a:ext uri="{28A0092B-C50C-407E-A947-70E740481C1C}">
                 <a14:useLocalDpi xmlns:a14="http://schemas.microsoft.com/office/drawing/2010/main" val="0"/>
@@ -9793,7 +10566,7 @@
           <p:nvPr/>
         </p:nvPicPr>
         <p:blipFill>
-          <a:blip r:embed="rId7"/>
+          <a:blip r:embed="rId8"/>
           <a:stretch>
             <a:fillRect/>
           </a:stretch>
@@ -10104,7 +10877,7 @@
           </p:nvPr>
         </p:nvPicPr>
         <p:blipFill>
-          <a:blip r:embed="rId2">
+          <a:blip r:embed="rId3">
             <a:extLst>
               <a:ext uri="{28A0092B-C50C-407E-A947-70E740481C1C}">
                 <a14:useLocalDpi xmlns:a14="http://schemas.microsoft.com/office/drawing/2010/main" val="0"/>
@@ -11660,4 +12433,299 @@
     </a:ext>
   </a:extLst>
 </a:theme>
+</file>
+
+<file path=ppt/theme/theme2.xml><?xml version="1.0" encoding="utf-8"?>
+<a:theme xmlns:a="http://schemas.openxmlformats.org/drawingml/2006/main" name="Office Theme">
+  <a:themeElements>
+    <a:clrScheme name="Office">
+      <a:dk1>
+        <a:sysClr val="windowText" lastClr="000000"/>
+      </a:dk1>
+      <a:lt1>
+        <a:sysClr val="window" lastClr="FFFFFF"/>
+      </a:lt1>
+      <a:dk2>
+        <a:srgbClr val="44546A"/>
+      </a:dk2>
+      <a:lt2>
+        <a:srgbClr val="E7E6E6"/>
+      </a:lt2>
+      <a:accent1>
+        <a:srgbClr val="4472C4"/>
+      </a:accent1>
+      <a:accent2>
+        <a:srgbClr val="ED7D31"/>
+      </a:accent2>
+      <a:accent3>
+        <a:srgbClr val="A5A5A5"/>
+      </a:accent3>
+      <a:accent4>
+        <a:srgbClr val="FFC000"/>
+      </a:accent4>
+      <a:accent5>
+        <a:srgbClr val="5B9BD5"/>
+      </a:accent5>
+      <a:accent6>
+        <a:srgbClr val="70AD47"/>
+      </a:accent6>
+      <a:hlink>
+        <a:srgbClr val="0563C1"/>
+      </a:hlink>
+      <a:folHlink>
+        <a:srgbClr val="954F72"/>
+      </a:folHlink>
+    </a:clrScheme>
+    <a:fontScheme name="Office">
+      <a:majorFont>
+        <a:latin typeface="Calibri Light" panose="020F0302020204030204"/>
+        <a:ea typeface=""/>
+        <a:cs typeface=""/>
+        <a:font script="Jpan" typeface="游ゴシック Light"/>
+        <a:font script="Hang" typeface="맑은 고딕"/>
+        <a:font script="Hans" typeface="等线 Light"/>
+        <a:font script="Hant" typeface="新細明體"/>
+        <a:font script="Arab" typeface="Times New Roman"/>
+        <a:font script="Hebr" typeface="Times New Roman"/>
+        <a:font script="Thai" typeface="Angsana New"/>
+        <a:font script="Ethi" typeface="Nyala"/>
+        <a:font script="Beng" typeface="Vrinda"/>
+        <a:font script="Gujr" typeface="Shruti"/>
+        <a:font script="Khmr" typeface="MoolBoran"/>
+        <a:font script="Knda" typeface="Tunga"/>
+        <a:font script="Guru" typeface="Raavi"/>
+        <a:font script="Cans" typeface="Euphemia"/>
+        <a:font script="Cher" typeface="Plantagenet Cherokee"/>
+        <a:font script="Yiii" typeface="Microsoft Yi Baiti"/>
+        <a:font script="Tibt" typeface="Microsoft Himalaya"/>
+        <a:font script="Thaa" typeface="MV Boli"/>
+        <a:font script="Deva" typeface="Mangal"/>
+        <a:font script="Telu" typeface="Gautami"/>
+        <a:font script="Taml" typeface="Latha"/>
+        <a:font script="Syrc" typeface="Estrangelo Edessa"/>
+        <a:font script="Orya" typeface="Kalinga"/>
+        <a:font script="Mlym" typeface="Kartika"/>
+        <a:font script="Laoo" typeface="DokChampa"/>
+        <a:font script="Sinh" typeface="Iskoola Pota"/>
+        <a:font script="Mong" typeface="Mongolian Baiti"/>
+        <a:font script="Viet" typeface="Times New Roman"/>
+        <a:font script="Uigh" typeface="Microsoft Uighur"/>
+        <a:font script="Geor" typeface="Sylfaen"/>
+        <a:font script="Armn" typeface="Arial"/>
+        <a:font script="Bugi" typeface="Leelawadee UI"/>
+        <a:font script="Bopo" typeface="Microsoft JhengHei"/>
+        <a:font script="Java" typeface="Javanese Text"/>
+        <a:font script="Lisu" typeface="Segoe UI"/>
+        <a:font script="Mymr" typeface="Myanmar Text"/>
+        <a:font script="Nkoo" typeface="Ebrima"/>
+        <a:font script="Olck" typeface="Nirmala UI"/>
+        <a:font script="Osma" typeface="Ebrima"/>
+        <a:font script="Phag" typeface="Phagspa"/>
+        <a:font script="Syrn" typeface="Estrangelo Edessa"/>
+        <a:font script="Syrj" typeface="Estrangelo Edessa"/>
+        <a:font script="Syre" typeface="Estrangelo Edessa"/>
+        <a:font script="Sora" typeface="Nirmala UI"/>
+        <a:font script="Tale" typeface="Microsoft Tai Le"/>
+        <a:font script="Talu" typeface="Microsoft New Tai Lue"/>
+        <a:font script="Tfng" typeface="Ebrima"/>
+      </a:majorFont>
+      <a:minorFont>
+        <a:latin typeface="Calibri" panose="020F0502020204030204"/>
+        <a:ea typeface=""/>
+        <a:cs typeface=""/>
+        <a:font script="Jpan" typeface="游ゴシック"/>
+        <a:font script="Hang" typeface="맑은 고딕"/>
+        <a:font script="Hans" typeface="等线"/>
+        <a:font script="Hant" typeface="新細明體"/>
+        <a:font script="Arab" typeface="Arial"/>
+        <a:font script="Hebr" typeface="Arial"/>
+        <a:font script="Thai" typeface="Cordia New"/>
+        <a:font script="Ethi" typeface="Nyala"/>
+        <a:font script="Beng" typeface="Vrinda"/>
+        <a:font script="Gujr" typeface="Shruti"/>
+        <a:font script="Khmr" typeface="DaunPenh"/>
+        <a:font script="Knda" typeface="Tunga"/>
+        <a:font script="Guru" typeface="Raavi"/>
+        <a:font script="Cans" typeface="Euphemia"/>
+        <a:font script="Cher" typeface="Plantagenet Cherokee"/>
+        <a:font script="Yiii" typeface="Microsoft Yi Baiti"/>
+        <a:font script="Tibt" typeface="Microsoft Himalaya"/>
+        <a:font script="Thaa" typeface="MV Boli"/>
+        <a:font script="Deva" typeface="Mangal"/>
+        <a:font script="Telu" typeface="Gautami"/>
+        <a:font script="Taml" typeface="Latha"/>
+        <a:font script="Syrc" typeface="Estrangelo Edessa"/>
+        <a:font script="Orya" typeface="Kalinga"/>
+        <a:font script="Mlym" typeface="Kartika"/>
+        <a:font script="Laoo" typeface="DokChampa"/>
+        <a:font script="Sinh" typeface="Iskoola Pota"/>
+        <a:font script="Mong" typeface="Mongolian Baiti"/>
+        <a:font script="Viet" typeface="Arial"/>
+        <a:font script="Uigh" typeface="Microsoft Uighur"/>
+        <a:font script="Geor" typeface="Sylfaen"/>
+        <a:font script="Armn" typeface="Arial"/>
+        <a:font script="Bugi" typeface="Leelawadee UI"/>
+        <a:font script="Bopo" typeface="Microsoft JhengHei"/>
+        <a:font script="Java" typeface="Javanese Text"/>
+        <a:font script="Lisu" typeface="Segoe UI"/>
+        <a:font script="Mymr" typeface="Myanmar Text"/>
+        <a:font script="Nkoo" typeface="Ebrima"/>
+        <a:font script="Olck" typeface="Nirmala UI"/>
+        <a:font script="Osma" typeface="Ebrima"/>
+        <a:font script="Phag" typeface="Phagspa"/>
+        <a:font script="Syrn" typeface="Estrangelo Edessa"/>
+        <a:font script="Syrj" typeface="Estrangelo Edessa"/>
+        <a:font script="Syre" typeface="Estrangelo Edessa"/>
+        <a:font script="Sora" typeface="Nirmala UI"/>
+        <a:font script="Tale" typeface="Microsoft Tai Le"/>
+        <a:font script="Talu" typeface="Microsoft New Tai Lue"/>
+        <a:font script="Tfng" typeface="Ebrima"/>
+      </a:minorFont>
+    </a:fontScheme>
+    <a:fmtScheme name="Office">
+      <a:fillStyleLst>
+        <a:solidFill>
+          <a:schemeClr val="phClr"/>
+        </a:solidFill>
+        <a:gradFill rotWithShape="1">
+          <a:gsLst>
+            <a:gs pos="0">
+              <a:schemeClr val="phClr">
+                <a:lumMod val="110000"/>
+                <a:satMod val="105000"/>
+                <a:tint val="67000"/>
+              </a:schemeClr>
+            </a:gs>
+            <a:gs pos="50000">
+              <a:schemeClr val="phClr">
+                <a:lumMod val="105000"/>
+                <a:satMod val="103000"/>
+                <a:tint val="73000"/>
+              </a:schemeClr>
+            </a:gs>
+            <a:gs pos="100000">
+              <a:schemeClr val="phClr">
+                <a:lumMod val="105000"/>
+                <a:satMod val="109000"/>
+                <a:tint val="81000"/>
+              </a:schemeClr>
+            </a:gs>
+          </a:gsLst>
+          <a:lin ang="5400000" scaled="0"/>
+        </a:gradFill>
+        <a:gradFill rotWithShape="1">
+          <a:gsLst>
+            <a:gs pos="0">
+              <a:schemeClr val="phClr">
+                <a:satMod val="103000"/>
+                <a:lumMod val="102000"/>
+                <a:tint val="94000"/>
+              </a:schemeClr>
+            </a:gs>
+            <a:gs pos="50000">
+              <a:schemeClr val="phClr">
+                <a:satMod val="110000"/>
+                <a:lumMod val="100000"/>
+                <a:shade val="100000"/>
+              </a:schemeClr>
+            </a:gs>
+            <a:gs pos="100000">
+              <a:schemeClr val="phClr">
+                <a:lumMod val="99000"/>
+                <a:satMod val="120000"/>
+                <a:shade val="78000"/>
+              </a:schemeClr>
+            </a:gs>
+          </a:gsLst>
+          <a:lin ang="5400000" scaled="0"/>
+        </a:gradFill>
+      </a:fillStyleLst>
+      <a:lnStyleLst>
+        <a:ln w="6350" cap="flat" cmpd="sng" algn="ctr">
+          <a:solidFill>
+            <a:schemeClr val="phClr"/>
+          </a:solidFill>
+          <a:prstDash val="solid"/>
+          <a:miter lim="800000"/>
+        </a:ln>
+        <a:ln w="12700" cap="flat" cmpd="sng" algn="ctr">
+          <a:solidFill>
+            <a:schemeClr val="phClr"/>
+          </a:solidFill>
+          <a:prstDash val="solid"/>
+          <a:miter lim="800000"/>
+        </a:ln>
+        <a:ln w="19050" cap="flat" cmpd="sng" algn="ctr">
+          <a:solidFill>
+            <a:schemeClr val="phClr"/>
+          </a:solidFill>
+          <a:prstDash val="solid"/>
+          <a:miter lim="800000"/>
+        </a:ln>
+      </a:lnStyleLst>
+      <a:effectStyleLst>
+        <a:effectStyle>
+          <a:effectLst/>
+        </a:effectStyle>
+        <a:effectStyle>
+          <a:effectLst/>
+        </a:effectStyle>
+        <a:effectStyle>
+          <a:effectLst>
+            <a:outerShdw blurRad="57150" dist="19050" dir="5400000" algn="ctr" rotWithShape="0">
+              <a:srgbClr val="000000">
+                <a:alpha val="63000"/>
+              </a:srgbClr>
+            </a:outerShdw>
+          </a:effectLst>
+        </a:effectStyle>
+      </a:effectStyleLst>
+      <a:bgFillStyleLst>
+        <a:solidFill>
+          <a:schemeClr val="phClr"/>
+        </a:solidFill>
+        <a:solidFill>
+          <a:schemeClr val="phClr">
+            <a:tint val="95000"/>
+            <a:satMod val="170000"/>
+          </a:schemeClr>
+        </a:solidFill>
+        <a:gradFill rotWithShape="1">
+          <a:gsLst>
+            <a:gs pos="0">
+              <a:schemeClr val="phClr">
+                <a:tint val="93000"/>
+                <a:satMod val="150000"/>
+                <a:shade val="98000"/>
+                <a:lumMod val="102000"/>
+              </a:schemeClr>
+            </a:gs>
+            <a:gs pos="50000">
+              <a:schemeClr val="phClr">
+                <a:tint val="98000"/>
+                <a:satMod val="130000"/>
+                <a:shade val="90000"/>
+                <a:lumMod val="103000"/>
+              </a:schemeClr>
+            </a:gs>
+            <a:gs pos="100000">
+              <a:schemeClr val="phClr">
+                <a:shade val="63000"/>
+                <a:satMod val="120000"/>
+              </a:schemeClr>
+            </a:gs>
+          </a:gsLst>
+          <a:lin ang="5400000" scaled="0"/>
+        </a:gradFill>
+      </a:bgFillStyleLst>
+    </a:fmtScheme>
+  </a:themeElements>
+  <a:objectDefaults/>
+  <a:extraClrSchemeLst/>
+  <a:extLst>
+    <a:ext uri="{05A4C25C-085E-4340-85A3-A5531E510DB2}">
+      <thm15:themeFamily xmlns:thm15="http://schemas.microsoft.com/office/thememl/2012/main" name="Office Theme" id="{62F939B6-93AF-4DB8-9C6B-D6C7DFDC589F}" vid="{4A3C46E8-61CC-4603-A589-7422A47A8E4A}"/>
+    </a:ext>
+  </a:extLst>
+</a:theme>
 </file>
</xml_diff>

<commit_message>
Moved Risk-Diagram to separate slide.
</commit_message>
<xml_diff>
--- a/documentation/IMS-Presentation.pptx
+++ b/documentation/IMS-Presentation.pptx
@@ -5,20 +5,21 @@
     <p:sldMasterId id="2147483720" r:id="rId1"/>
   </p:sldMasterIdLst>
   <p:notesMasterIdLst>
-    <p:notesMasterId r:id="rId13"/>
+    <p:notesMasterId r:id="rId14"/>
   </p:notesMasterIdLst>
   <p:sldIdLst>
     <p:sldId id="256" r:id="rId2"/>
     <p:sldId id="257" r:id="rId3"/>
     <p:sldId id="258" r:id="rId4"/>
-    <p:sldId id="259" r:id="rId5"/>
-    <p:sldId id="260" r:id="rId6"/>
-    <p:sldId id="265" r:id="rId7"/>
-    <p:sldId id="261" r:id="rId8"/>
-    <p:sldId id="262" r:id="rId9"/>
-    <p:sldId id="263" r:id="rId10"/>
-    <p:sldId id="264" r:id="rId11"/>
-    <p:sldId id="266" r:id="rId12"/>
+    <p:sldId id="267" r:id="rId5"/>
+    <p:sldId id="259" r:id="rId6"/>
+    <p:sldId id="260" r:id="rId7"/>
+    <p:sldId id="265" r:id="rId8"/>
+    <p:sldId id="261" r:id="rId9"/>
+    <p:sldId id="262" r:id="rId10"/>
+    <p:sldId id="263" r:id="rId11"/>
+    <p:sldId id="264" r:id="rId12"/>
+    <p:sldId id="266" r:id="rId13"/>
   </p:sldIdLst>
   <p:sldSz cx="12192000" cy="6858000"/>
   <p:notesSz cx="6858000" cy="9144000"/>
@@ -712,25 +713,15 @@
           <a:p>
             <a:r>
               <a:rPr lang="en-GB" dirty="0"/>
-              <a:t>As mentioned, I learned a lot about properly organising a git-repo. For this project, I started with forking from the IMS Starter, and made sure to follow the dev/feature branch model set-out. So I completed most of my work in the dev branch, using feature branches as I worked on elements of the project like adding Items or Orders functionality. I also used ‘test’ branches when I was writing out test code.</a:t>
-            </a:r>
-          </a:p>
-          <a:p>
-            <a:endParaRPr lang="en-GB" dirty="0"/>
-          </a:p>
-          <a:p>
+              <a:t>When I started this project, I already had some familiarity with Java and SQL, but I learned a lot about using Junit for testing and using Maven – the build tool for this project. I also learned a lot about managing and organising a project, including how to properly  manage  a git-repo in Enterprise style, and how to prioritise tasks using </a:t>
+            </a:r>
+            <a:r>
+              <a:rPr lang="en-GB" dirty="0" err="1"/>
+              <a:t>MoSCoW</a:t>
+            </a:r>
             <a:r>
               <a:rPr lang="en-GB" dirty="0"/>
-              <a:t>In addition to this, I also created a hot-fix branch after my first merge from dev to master, after realising I’d missed a problem with the Order CRUD functionality. </a:t>
-            </a:r>
-          </a:p>
-          <a:p>
-            <a:endParaRPr lang="en-GB" dirty="0"/>
-          </a:p>
-          <a:p>
-            <a:r>
-              <a:rPr lang="en-GB" dirty="0"/>
-              <a:t>When I did have working code to be pushed to master, I pushed these as Versions, using semantic versioning – you can see the ‘release’ on my git-page is marked as 1.1.1</a:t>
+              <a:t> estimation.</a:t>
             </a:r>
           </a:p>
         </p:txBody>
@@ -761,7 +752,7 @@
     </p:spTree>
     <p:extLst>
       <p:ext uri="{BB962C8B-B14F-4D97-AF65-F5344CB8AC3E}">
-        <p14:creationId xmlns:p14="http://schemas.microsoft.com/office/powerpoint/2010/main" val="1087713828"/>
+        <p14:creationId xmlns:p14="http://schemas.microsoft.com/office/powerpoint/2010/main" val="2239975254"/>
       </p:ext>
     </p:extLst>
   </p:cSld>
@@ -817,7 +808,7 @@
           <a:p>
             <a:r>
               <a:rPr lang="en-GB" dirty="0"/>
-              <a:t>Moving on to testing my project, I achieved around 66% coverage, most of which is done using JUnit. There is some Mockito code for testing the Customer controller, which I was able to replicate for the Item controller – but not for the Order / Order-Item controllers as they are a bit more complex and we have not yet covered Mockito. </a:t>
+              <a:t>As mentioned, I learned a lot about properly organising a git-repo. For this project, I started with forking from the IMS Starter, and made sure to follow the dev/feature branch model set-out. So I completed most of my work in the dev branch, using feature branches as I worked on elements of the project like adding Items or Orders functionality. I also used ‘test’ branches when I was writing out test code.</a:t>
             </a:r>
           </a:p>
           <a:p>
@@ -826,30 +817,16 @@
           <a:p>
             <a:r>
               <a:rPr lang="en-GB" dirty="0"/>
-              <a:t>The testing did come in useful, as I had not properly written out the </a:t>
-            </a:r>
-            <a:r>
-              <a:rPr lang="en-GB" dirty="0" err="1"/>
-              <a:t>HashCode</a:t>
-            </a:r>
+              <a:t>In addition to this, I also created a hot-fix branch after my first merge from dev to master, after realising I’d missed a problem with the Order CRUD functionality. </a:t>
+            </a:r>
+          </a:p>
+          <a:p>
+            <a:endParaRPr lang="en-GB" dirty="0"/>
+          </a:p>
+          <a:p>
             <a:r>
               <a:rPr lang="en-GB" dirty="0"/>
-              <a:t> for my order class, which caused problems when using a HashMap later – I was able to diagnose and fix the problem thanks to the tests.</a:t>
-            </a:r>
-          </a:p>
-          <a:p>
-            <a:endParaRPr lang="en-GB" dirty="0"/>
-          </a:p>
-          <a:p>
-            <a:r>
-              <a:rPr lang="en-GB" dirty="0"/>
-              <a:t>Some of the lacking coverage is with the Controllers, as I said, we haven’t covered Mockito. There is also some missing Junit tests for the Domain classes, as shown, since they are Enumerator classes and I wasn’t sure how to test / whether it was necessary to test them since they don’t contain any complex methods. </a:t>
-            </a:r>
-          </a:p>
-          <a:p>
-            <a:r>
-              <a:rPr lang="en-GB" dirty="0"/>
-              <a:t>A lot of the DAO classes are also missing some coverage in the “catch” segments, where they simply report to the user the nature of the error. I wasn’t sure how to test for catching of exceptions and even if I did, the code tested in the catch is print statements.</a:t>
+              <a:t>When I did have working code to be pushed to master, I pushed these as Versions, using semantic versioning – you can see the ‘release’ on my git-page is marked as 1.1.1</a:t>
             </a:r>
           </a:p>
         </p:txBody>
@@ -880,7 +857,7 @@
     </p:spTree>
     <p:extLst>
       <p:ext uri="{BB962C8B-B14F-4D97-AF65-F5344CB8AC3E}">
-        <p14:creationId xmlns:p14="http://schemas.microsoft.com/office/powerpoint/2010/main" val="2135172519"/>
+        <p14:creationId xmlns:p14="http://schemas.microsoft.com/office/powerpoint/2010/main" val="1087713828"/>
       </p:ext>
     </p:extLst>
   </p:cSld>
@@ -936,7 +913,7 @@
           <a:p>
             <a:r>
               <a:rPr lang="en-GB" dirty="0"/>
-              <a:t>Before I demo, I just want to walk you through my project operational structure. On the left, shown is how the user performs operations through the Command-Line interface. The Customer and Items behave the same. Orders are done differently – with Read, Create and Delete being the same, however Update branches into update-details (behaves like Items, Customers) or to update Order-Items which leads to another CRUD menu.</a:t>
+              <a:t>Moving on to testing my project, I achieved around 66% coverage, most of which is done using JUnit. There is some Mockito code for testing the Customer controller, which I was able to replicate for the Item controller – but not for the Order / Order-Item controllers as they are a bit more complex and we have not yet covered Mockito. </a:t>
             </a:r>
           </a:p>
           <a:p>
@@ -945,7 +922,30 @@
           <a:p>
             <a:r>
               <a:rPr lang="en-GB" dirty="0"/>
-              <a:t>On the right is my Entity-Relationship diagram. </a:t>
+              <a:t>The testing did come in useful, as I had not properly written out the </a:t>
+            </a:r>
+            <a:r>
+              <a:rPr lang="en-GB" dirty="0" err="1"/>
+              <a:t>HashCode</a:t>
+            </a:r>
+            <a:r>
+              <a:rPr lang="en-GB" dirty="0"/>
+              <a:t> for my order class, which caused problems when using a HashMap later – I was able to diagnose and fix the problem thanks to the tests.</a:t>
+            </a:r>
+          </a:p>
+          <a:p>
+            <a:endParaRPr lang="en-GB" dirty="0"/>
+          </a:p>
+          <a:p>
+            <a:r>
+              <a:rPr lang="en-GB" dirty="0"/>
+              <a:t>Some of the lacking coverage is with the Controllers, as I said, we haven’t covered Mockito. There is also some missing Junit tests for the Domain classes, as shown, since they are Enumerator classes and I wasn’t sure how to test / whether it was necessary to test them since they don’t contain any complex methods. </a:t>
+            </a:r>
+          </a:p>
+          <a:p>
+            <a:r>
+              <a:rPr lang="en-GB" dirty="0"/>
+              <a:t>A lot of the DAO classes are also missing some coverage in the “catch” segments, where they simply report to the user the nature of the error. I wasn’t sure how to test for catching of exceptions and even if I did, the code tested in the catch is print statements.</a:t>
             </a:r>
           </a:p>
         </p:txBody>
@@ -976,7 +976,7 @@
     </p:spTree>
     <p:extLst>
       <p:ext uri="{BB962C8B-B14F-4D97-AF65-F5344CB8AC3E}">
-        <p14:creationId xmlns:p14="http://schemas.microsoft.com/office/powerpoint/2010/main" val="3038847635"/>
+        <p14:creationId xmlns:p14="http://schemas.microsoft.com/office/powerpoint/2010/main" val="2135172519"/>
       </p:ext>
     </p:extLst>
   </p:cSld>
@@ -1032,19 +1032,16 @@
           <a:p>
             <a:r>
               <a:rPr lang="en-GB" dirty="0"/>
-              <a:t>In my sprint, I achieved all the tasks tagged with ‘Must’ and ‘Should’, as well as a number of those tagged as ‘could’.</a:t>
-            </a:r>
+              <a:t>Before I demo, I just want to walk you through my project operational structure. On the left, shown is how the user performs operations through the Command-Line interface. The Customer and Items behave the same. Orders are done differently – with Read, Create and Delete being the same, however Update branches into update-details (behaves like Items, Customers) or to update Order-Items which leads to another CRUD menu.</a:t>
+            </a:r>
+          </a:p>
+          <a:p>
+            <a:endParaRPr lang="en-GB" dirty="0"/>
           </a:p>
           <a:p>
             <a:r>
               <a:rPr lang="en-GB" dirty="0"/>
-              <a:t>This includes all the Customer and Item operations specified, as well as a majority of the order operations.</a:t>
-            </a:r>
-          </a:p>
-          <a:p>
-            <a:r>
-              <a:rPr lang="en-GB" dirty="0"/>
-              <a:t>A couple of tasks / stories were returned to the backlog, including setting up a GCP connection – after being told it was no-longer necessary, and tasks related to user login, as this was not a minimum requirement.</a:t>
+              <a:t>On the right is my Entity-Relationship diagram. </a:t>
             </a:r>
           </a:p>
         </p:txBody>
@@ -1066,7 +1063,7 @@
           <a:p>
             <a:fld id="{5DCBFF80-3A6B-480D-8452-6B1BD2B3F655}" type="slidenum">
               <a:rPr lang="en-GB" smtClean="0"/>
-              <a:t>8</a:t>
+              <a:t>7</a:t>
             </a:fld>
             <a:endParaRPr lang="en-GB"/>
           </a:p>
@@ -1075,7 +1072,7 @@
     </p:spTree>
     <p:extLst>
       <p:ext uri="{BB962C8B-B14F-4D97-AF65-F5344CB8AC3E}">
-        <p14:creationId xmlns:p14="http://schemas.microsoft.com/office/powerpoint/2010/main" val="3266477984"/>
+        <p14:creationId xmlns:p14="http://schemas.microsoft.com/office/powerpoint/2010/main" val="3038847635"/>
       </p:ext>
     </p:extLst>
   </p:cSld>
@@ -1131,16 +1128,19 @@
           <a:p>
             <a:r>
               <a:rPr lang="en-GB" dirty="0"/>
-              <a:t>Reflecting on this sprint, I am pleased that my project bears some semblance to what I planned – the classes I thought would be there exist in some form, my database schema has remained largely the same. I feel my prioritisation of tasks worked well, helping me get quickly up to speed with the way the code works and enabling me to write my own and make changes that I understood the consequences of.</a:t>
-            </a:r>
-          </a:p>
-          <a:p>
-            <a:endParaRPr lang="en-GB" dirty="0"/>
+              <a:t>In my sprint, I achieved all the tasks tagged with ‘Must’ and ‘Should’, as well as a number of those tagged as ‘could’.</a:t>
+            </a:r>
           </a:p>
           <a:p>
             <a:r>
               <a:rPr lang="en-GB" dirty="0"/>
-              <a:t>I think I could do much better in terms of user-story coverage, as well as story-points. I could also have a more detailed break-down of tasks, i.e. instead of having “make the Item-Controller” I could have had “Make the controller create method”… and so on.</a:t>
+              <a:t>This includes all the Customer and Item operations specified, as well as a majority of the order operations.</a:t>
+            </a:r>
+          </a:p>
+          <a:p>
+            <a:r>
+              <a:rPr lang="en-GB" dirty="0"/>
+              <a:t>A couple of tasks / stories were returned to the backlog, including setting up a GCP connection – after being told it was no-longer necessary, and tasks related to user login, as this was not a minimum requirement.</a:t>
             </a:r>
           </a:p>
         </p:txBody>
@@ -1163,6 +1163,102 @@
             <a:fld id="{5DCBFF80-3A6B-480D-8452-6B1BD2B3F655}" type="slidenum">
               <a:rPr lang="en-GB" smtClean="0"/>
               <a:t>9</a:t>
+            </a:fld>
+            <a:endParaRPr lang="en-GB"/>
+          </a:p>
+        </p:txBody>
+      </p:sp>
+    </p:spTree>
+    <p:extLst>
+      <p:ext uri="{BB962C8B-B14F-4D97-AF65-F5344CB8AC3E}">
+        <p14:creationId xmlns:p14="http://schemas.microsoft.com/office/powerpoint/2010/main" val="3266477984"/>
+      </p:ext>
+    </p:extLst>
+  </p:cSld>
+  <p:clrMapOvr>
+    <a:masterClrMapping/>
+  </p:clrMapOvr>
+</p:notes>
+</file>
+
+<file path=ppt/notesSlides/notesSlide8.xml><?xml version="1.0" encoding="utf-8"?>
+<p:notes xmlns:a="http://schemas.openxmlformats.org/drawingml/2006/main" xmlns:r="http://schemas.openxmlformats.org/officeDocument/2006/relationships" xmlns:p="http://schemas.openxmlformats.org/presentationml/2006/main">
+  <p:cSld>
+    <p:spTree>
+      <p:nvGrpSpPr>
+        <p:cNvPr id="1" name=""/>
+        <p:cNvGrpSpPr/>
+        <p:nvPr/>
+      </p:nvGrpSpPr>
+      <p:grpSpPr>
+        <a:xfrm>
+          <a:off x="0" y="0"/>
+          <a:ext cx="0" cy="0"/>
+          <a:chOff x="0" y="0"/>
+          <a:chExt cx="0" cy="0"/>
+        </a:xfrm>
+      </p:grpSpPr>
+      <p:sp>
+        <p:nvSpPr>
+          <p:cNvPr id="2" name="Slide Image Placeholder 1"/>
+          <p:cNvSpPr>
+            <a:spLocks noGrp="1" noRot="1" noChangeAspect="1"/>
+          </p:cNvSpPr>
+          <p:nvPr>
+            <p:ph type="sldImg"/>
+          </p:nvPr>
+        </p:nvSpPr>
+        <p:spPr/>
+      </p:sp>
+      <p:sp>
+        <p:nvSpPr>
+          <p:cNvPr id="3" name="Notes Placeholder 2"/>
+          <p:cNvSpPr>
+            <a:spLocks noGrp="1"/>
+          </p:cNvSpPr>
+          <p:nvPr>
+            <p:ph type="body" idx="1"/>
+          </p:nvPr>
+        </p:nvSpPr>
+        <p:spPr/>
+        <p:txBody>
+          <a:bodyPr/>
+          <a:lstStyle/>
+          <a:p>
+            <a:r>
+              <a:rPr lang="en-GB" dirty="0"/>
+              <a:t>Reflecting on this sprint, I am pleased that my project bears some semblance to what I planned – the classes I thought would be there exist in some form, my database schema has remained largely the same. I feel my prioritisation of tasks worked well, helping me get quickly up to speed with the way the code works and enabling me to write my own and make changes that I understood the consequences of.</a:t>
+            </a:r>
+          </a:p>
+          <a:p>
+            <a:endParaRPr lang="en-GB" dirty="0"/>
+          </a:p>
+          <a:p>
+            <a:r>
+              <a:rPr lang="en-GB" dirty="0"/>
+              <a:t>I think I could do much better in terms of user-story coverage, as well as story-points. I could also have a more detailed break-down of tasks, i.e. instead of having “make the Item-Controller” I could have had “Make the controller create method”… and so on.</a:t>
+            </a:r>
+          </a:p>
+        </p:txBody>
+      </p:sp>
+      <p:sp>
+        <p:nvSpPr>
+          <p:cNvPr id="4" name="Slide Number Placeholder 3"/>
+          <p:cNvSpPr>
+            <a:spLocks noGrp="1"/>
+          </p:cNvSpPr>
+          <p:nvPr>
+            <p:ph type="sldNum" sz="quarter" idx="5"/>
+          </p:nvPr>
+        </p:nvSpPr>
+        <p:spPr/>
+        <p:txBody>
+          <a:bodyPr/>
+          <a:lstStyle/>
+          <a:p>
+            <a:fld id="{5DCBFF80-3A6B-480D-8452-6B1BD2B3F655}" type="slidenum">
+              <a:rPr lang="en-GB" smtClean="0"/>
+              <a:t>10</a:t>
             </a:fld>
             <a:endParaRPr lang="en-GB"/>
           </a:p>
@@ -7297,6 +7393,485 @@
           <p:cNvPr id="2" name="Title 1">
             <a:extLst>
               <a:ext uri="{FF2B5EF4-FFF2-40B4-BE49-F238E27FC236}">
+                <a16:creationId xmlns:a16="http://schemas.microsoft.com/office/drawing/2014/main" id="{33FADC91-3227-4B2C-A891-810D1D8D4830}"/>
+              </a:ext>
+            </a:extLst>
+          </p:cNvPr>
+          <p:cNvSpPr>
+            <a:spLocks noGrp="1"/>
+          </p:cNvSpPr>
+          <p:nvPr>
+            <p:ph type="title"/>
+          </p:nvPr>
+        </p:nvSpPr>
+        <p:spPr/>
+        <p:txBody>
+          <a:bodyPr/>
+          <a:lstStyle/>
+          <a:p>
+            <a:r>
+              <a:rPr lang="en-GB" dirty="0"/>
+              <a:t>Sprint Retrospective</a:t>
+            </a:r>
+          </a:p>
+        </p:txBody>
+      </p:sp>
+      <p:sp>
+        <p:nvSpPr>
+          <p:cNvPr id="4" name="Text Placeholder 3">
+            <a:extLst>
+              <a:ext uri="{FF2B5EF4-FFF2-40B4-BE49-F238E27FC236}">
+                <a16:creationId xmlns:a16="http://schemas.microsoft.com/office/drawing/2014/main" id="{224B78D1-7C7E-4772-B4E4-DA6E2B079842}"/>
+              </a:ext>
+            </a:extLst>
+          </p:cNvPr>
+          <p:cNvSpPr>
+            <a:spLocks noGrp="1"/>
+          </p:cNvSpPr>
+          <p:nvPr>
+            <p:ph type="body" idx="1"/>
+          </p:nvPr>
+        </p:nvSpPr>
+        <p:spPr/>
+        <p:txBody>
+          <a:bodyPr/>
+          <a:lstStyle/>
+          <a:p>
+            <a:r>
+              <a:rPr lang="en-GB" dirty="0"/>
+              <a:t>Accomplishments</a:t>
+            </a:r>
+          </a:p>
+        </p:txBody>
+      </p:sp>
+      <p:sp>
+        <p:nvSpPr>
+          <p:cNvPr id="5" name="Content Placeholder 4">
+            <a:extLst>
+              <a:ext uri="{FF2B5EF4-FFF2-40B4-BE49-F238E27FC236}">
+                <a16:creationId xmlns:a16="http://schemas.microsoft.com/office/drawing/2014/main" id="{726371C0-EFB0-4C54-8CC4-6990B05A88FB}"/>
+              </a:ext>
+            </a:extLst>
+          </p:cNvPr>
+          <p:cNvSpPr>
+            <a:spLocks noGrp="1"/>
+          </p:cNvSpPr>
+          <p:nvPr>
+            <p:ph sz="half" idx="2"/>
+          </p:nvPr>
+        </p:nvSpPr>
+        <p:spPr/>
+        <p:txBody>
+          <a:bodyPr/>
+          <a:lstStyle/>
+          <a:p>
+            <a:r>
+              <a:rPr lang="en-GB" dirty="0"/>
+              <a:t>My product still bears some resemblance to my planning</a:t>
+            </a:r>
+          </a:p>
+          <a:p>
+            <a:pPr lvl="1"/>
+            <a:r>
+              <a:rPr lang="en-GB" dirty="0"/>
+              <a:t>Table structures</a:t>
+            </a:r>
+          </a:p>
+          <a:p>
+            <a:pPr lvl="1"/>
+            <a:r>
+              <a:rPr lang="en-GB" dirty="0"/>
+              <a:t>Features</a:t>
+            </a:r>
+          </a:p>
+          <a:p>
+            <a:r>
+              <a:rPr lang="en-GB" dirty="0"/>
+              <a:t>Task prioritisation seemed to work</a:t>
+            </a:r>
+          </a:p>
+          <a:p>
+            <a:pPr lvl="1"/>
+            <a:r>
+              <a:rPr lang="en-GB" dirty="0"/>
+              <a:t>Completing ‘small’ or ‘easier’ tasks, first</a:t>
+            </a:r>
+          </a:p>
+          <a:p>
+            <a:pPr lvl="1"/>
+            <a:r>
+              <a:rPr lang="en-GB" dirty="0"/>
+              <a:t>Moving on to more complex ones</a:t>
+            </a:r>
+          </a:p>
+        </p:txBody>
+      </p:sp>
+      <p:sp>
+        <p:nvSpPr>
+          <p:cNvPr id="6" name="Text Placeholder 5">
+            <a:extLst>
+              <a:ext uri="{FF2B5EF4-FFF2-40B4-BE49-F238E27FC236}">
+                <a16:creationId xmlns:a16="http://schemas.microsoft.com/office/drawing/2014/main" id="{3F1FE110-0C2B-424E-A353-1564B64614F0}"/>
+              </a:ext>
+            </a:extLst>
+          </p:cNvPr>
+          <p:cNvSpPr>
+            <a:spLocks noGrp="1"/>
+          </p:cNvSpPr>
+          <p:nvPr>
+            <p:ph type="body" sz="quarter" idx="3"/>
+          </p:nvPr>
+        </p:nvSpPr>
+        <p:spPr/>
+        <p:txBody>
+          <a:bodyPr/>
+          <a:lstStyle/>
+          <a:p>
+            <a:r>
+              <a:rPr lang="en-GB" dirty="0"/>
+              <a:t>Areas for Improvement</a:t>
+            </a:r>
+          </a:p>
+        </p:txBody>
+      </p:sp>
+      <p:sp>
+        <p:nvSpPr>
+          <p:cNvPr id="7" name="Content Placeholder 6">
+            <a:extLst>
+              <a:ext uri="{FF2B5EF4-FFF2-40B4-BE49-F238E27FC236}">
+                <a16:creationId xmlns:a16="http://schemas.microsoft.com/office/drawing/2014/main" id="{EACCE9D3-4FA2-4153-9FFC-1DEED30F4208}"/>
+              </a:ext>
+            </a:extLst>
+          </p:cNvPr>
+          <p:cNvSpPr>
+            <a:spLocks noGrp="1"/>
+          </p:cNvSpPr>
+          <p:nvPr>
+            <p:ph sz="quarter" idx="4"/>
+          </p:nvPr>
+        </p:nvSpPr>
+        <p:spPr/>
+        <p:txBody>
+          <a:bodyPr/>
+          <a:lstStyle/>
+          <a:p>
+            <a:r>
+              <a:rPr lang="en-GB" dirty="0"/>
+              <a:t>Could do with greater User-Story coverage</a:t>
+            </a:r>
+          </a:p>
+          <a:p>
+            <a:r>
+              <a:rPr lang="en-GB" dirty="0"/>
+              <a:t>Better Story-pointing</a:t>
+            </a:r>
+          </a:p>
+          <a:p>
+            <a:pPr lvl="1"/>
+            <a:r>
+              <a:rPr lang="en-GB" dirty="0"/>
+              <a:t>Would be useful for gauging time needed</a:t>
+            </a:r>
+          </a:p>
+          <a:p>
+            <a:r>
+              <a:rPr lang="en-GB" dirty="0"/>
+              <a:t>More detailed break-down of tasks</a:t>
+            </a:r>
+          </a:p>
+          <a:p>
+            <a:pPr lvl="1"/>
+            <a:r>
+              <a:rPr lang="en-GB" dirty="0"/>
+              <a:t>Creating / Updating tasks as changes in project occur</a:t>
+            </a:r>
+            <a:br>
+              <a:rPr lang="en-GB" dirty="0"/>
+            </a:br>
+            <a:r>
+              <a:rPr lang="en-GB" dirty="0" err="1"/>
+              <a:t>i.e</a:t>
+            </a:r>
+            <a:r>
+              <a:rPr lang="en-GB" dirty="0"/>
+              <a:t>: Viewing Order History</a:t>
+            </a:r>
+          </a:p>
+        </p:txBody>
+      </p:sp>
+    </p:spTree>
+    <p:extLst>
+      <p:ext uri="{BB962C8B-B14F-4D97-AF65-F5344CB8AC3E}">
+        <p14:creationId xmlns:p14="http://schemas.microsoft.com/office/powerpoint/2010/main" val="1545188398"/>
+      </p:ext>
+    </p:extLst>
+  </p:cSld>
+  <p:clrMapOvr>
+    <a:masterClrMapping/>
+  </p:clrMapOvr>
+  <p:timing>
+    <p:tnLst>
+      <p:par>
+        <p:cTn id="1" dur="indefinite" restart="never" nodeType="tmRoot">
+          <p:childTnLst>
+            <p:seq concurrent="1" nextAc="seek">
+              <p:cTn id="2" dur="indefinite" nodeType="mainSeq">
+                <p:childTnLst>
+                  <p:par>
+                    <p:cTn id="3" fill="hold">
+                      <p:stCondLst>
+                        <p:cond delay="indefinite"/>
+                      </p:stCondLst>
+                      <p:childTnLst>
+                        <p:par>
+                          <p:cTn id="4" fill="hold">
+                            <p:stCondLst>
+                              <p:cond delay="0"/>
+                            </p:stCondLst>
+                            <p:childTnLst>
+                              <p:par>
+                                <p:cTn id="5" presetID="1" presetClass="entr" presetSubtype="0" fill="hold" grpId="0" nodeType="clickEffect">
+                                  <p:stCondLst>
+                                    <p:cond delay="0"/>
+                                  </p:stCondLst>
+                                  <p:childTnLst>
+                                    <p:set>
+                                      <p:cBhvr>
+                                        <p:cTn id="6" dur="1" fill="hold">
+                                          <p:stCondLst>
+                                            <p:cond delay="0"/>
+                                          </p:stCondLst>
+                                        </p:cTn>
+                                        <p:tgtEl>
+                                          <p:spTgt spid="7">
+                                            <p:txEl>
+                                              <p:pRg st="0" end="0"/>
+                                            </p:txEl>
+                                          </p:spTgt>
+                                        </p:tgtEl>
+                                        <p:attrNameLst>
+                                          <p:attrName>style.visibility</p:attrName>
+                                        </p:attrNameLst>
+                                      </p:cBhvr>
+                                      <p:to>
+                                        <p:strVal val="visible"/>
+                                      </p:to>
+                                    </p:set>
+                                  </p:childTnLst>
+                                </p:cTn>
+                              </p:par>
+                              <p:par>
+                                <p:cTn id="7" presetID="1" presetClass="entr" presetSubtype="0" fill="hold" grpId="0" nodeType="withEffect">
+                                  <p:stCondLst>
+                                    <p:cond delay="0"/>
+                                  </p:stCondLst>
+                                  <p:childTnLst>
+                                    <p:set>
+                                      <p:cBhvr>
+                                        <p:cTn id="8" dur="1" fill="hold">
+                                          <p:stCondLst>
+                                            <p:cond delay="0"/>
+                                          </p:stCondLst>
+                                        </p:cTn>
+                                        <p:tgtEl>
+                                          <p:spTgt spid="7">
+                                            <p:txEl>
+                                              <p:pRg st="1" end="1"/>
+                                            </p:txEl>
+                                          </p:spTgt>
+                                        </p:tgtEl>
+                                        <p:attrNameLst>
+                                          <p:attrName>style.visibility</p:attrName>
+                                        </p:attrNameLst>
+                                      </p:cBhvr>
+                                      <p:to>
+                                        <p:strVal val="visible"/>
+                                      </p:to>
+                                    </p:set>
+                                  </p:childTnLst>
+                                </p:cTn>
+                              </p:par>
+                              <p:par>
+                                <p:cTn id="9" presetID="1" presetClass="entr" presetSubtype="0" fill="hold" grpId="0" nodeType="withEffect">
+                                  <p:stCondLst>
+                                    <p:cond delay="0"/>
+                                  </p:stCondLst>
+                                  <p:childTnLst>
+                                    <p:set>
+                                      <p:cBhvr>
+                                        <p:cTn id="10" dur="1" fill="hold">
+                                          <p:stCondLst>
+                                            <p:cond delay="0"/>
+                                          </p:stCondLst>
+                                        </p:cTn>
+                                        <p:tgtEl>
+                                          <p:spTgt spid="7">
+                                            <p:txEl>
+                                              <p:pRg st="2" end="2"/>
+                                            </p:txEl>
+                                          </p:spTgt>
+                                        </p:tgtEl>
+                                        <p:attrNameLst>
+                                          <p:attrName>style.visibility</p:attrName>
+                                        </p:attrNameLst>
+                                      </p:cBhvr>
+                                      <p:to>
+                                        <p:strVal val="visible"/>
+                                      </p:to>
+                                    </p:set>
+                                  </p:childTnLst>
+                                </p:cTn>
+                              </p:par>
+                              <p:par>
+                                <p:cTn id="11" presetID="1" presetClass="entr" presetSubtype="0" fill="hold" grpId="0" nodeType="withEffect">
+                                  <p:stCondLst>
+                                    <p:cond delay="0"/>
+                                  </p:stCondLst>
+                                  <p:childTnLst>
+                                    <p:set>
+                                      <p:cBhvr>
+                                        <p:cTn id="12" dur="1" fill="hold">
+                                          <p:stCondLst>
+                                            <p:cond delay="0"/>
+                                          </p:stCondLst>
+                                        </p:cTn>
+                                        <p:tgtEl>
+                                          <p:spTgt spid="7">
+                                            <p:txEl>
+                                              <p:pRg st="3" end="3"/>
+                                            </p:txEl>
+                                          </p:spTgt>
+                                        </p:tgtEl>
+                                        <p:attrNameLst>
+                                          <p:attrName>style.visibility</p:attrName>
+                                        </p:attrNameLst>
+                                      </p:cBhvr>
+                                      <p:to>
+                                        <p:strVal val="visible"/>
+                                      </p:to>
+                                    </p:set>
+                                  </p:childTnLst>
+                                </p:cTn>
+                              </p:par>
+                              <p:par>
+                                <p:cTn id="13" presetID="1" presetClass="entr" presetSubtype="0" fill="hold" grpId="0" nodeType="withEffect">
+                                  <p:stCondLst>
+                                    <p:cond delay="0"/>
+                                  </p:stCondLst>
+                                  <p:childTnLst>
+                                    <p:set>
+                                      <p:cBhvr>
+                                        <p:cTn id="14" dur="1" fill="hold">
+                                          <p:stCondLst>
+                                            <p:cond delay="0"/>
+                                          </p:stCondLst>
+                                        </p:cTn>
+                                        <p:tgtEl>
+                                          <p:spTgt spid="7">
+                                            <p:txEl>
+                                              <p:pRg st="4" end="4"/>
+                                            </p:txEl>
+                                          </p:spTgt>
+                                        </p:tgtEl>
+                                        <p:attrNameLst>
+                                          <p:attrName>style.visibility</p:attrName>
+                                        </p:attrNameLst>
+                                      </p:cBhvr>
+                                      <p:to>
+                                        <p:strVal val="visible"/>
+                                      </p:to>
+                                    </p:set>
+                                  </p:childTnLst>
+                                </p:cTn>
+                              </p:par>
+                              <p:par>
+                                <p:cTn id="15" presetID="1" presetClass="entr" presetSubtype="0" fill="hold" grpId="0" nodeType="withEffect">
+                                  <p:stCondLst>
+                                    <p:cond delay="0"/>
+                                  </p:stCondLst>
+                                  <p:childTnLst>
+                                    <p:set>
+                                      <p:cBhvr>
+                                        <p:cTn id="16" dur="1" fill="hold">
+                                          <p:stCondLst>
+                                            <p:cond delay="0"/>
+                                          </p:stCondLst>
+                                        </p:cTn>
+                                        <p:tgtEl>
+                                          <p:spTgt spid="6">
+                                            <p:txEl>
+                                              <p:pRg st="0" end="0"/>
+                                            </p:txEl>
+                                          </p:spTgt>
+                                        </p:tgtEl>
+                                        <p:attrNameLst>
+                                          <p:attrName>style.visibility</p:attrName>
+                                        </p:attrNameLst>
+                                      </p:cBhvr>
+                                      <p:to>
+                                        <p:strVal val="visible"/>
+                                      </p:to>
+                                    </p:set>
+                                  </p:childTnLst>
+                                </p:cTn>
+                              </p:par>
+                            </p:childTnLst>
+                          </p:cTn>
+                        </p:par>
+                      </p:childTnLst>
+                    </p:cTn>
+                  </p:par>
+                </p:childTnLst>
+              </p:cTn>
+              <p:prevCondLst>
+                <p:cond evt="onPrev" delay="0">
+                  <p:tgtEl>
+                    <p:sldTgt/>
+                  </p:tgtEl>
+                </p:cond>
+              </p:prevCondLst>
+              <p:nextCondLst>
+                <p:cond evt="onNext" delay="0">
+                  <p:tgtEl>
+                    <p:sldTgt/>
+                  </p:tgtEl>
+                </p:cond>
+              </p:nextCondLst>
+            </p:seq>
+          </p:childTnLst>
+        </p:cTn>
+      </p:par>
+    </p:tnLst>
+    <p:bldLst>
+      <p:bldP spid="6" grpId="0" build="p"/>
+      <p:bldP spid="7" grpId="0" build="p"/>
+    </p:bldLst>
+  </p:timing>
+</p:sld>
+</file>
+
+<file path=ppt/slides/slide11.xml><?xml version="1.0" encoding="utf-8"?>
+<p:sld xmlns:a="http://schemas.openxmlformats.org/drawingml/2006/main" xmlns:r="http://schemas.openxmlformats.org/officeDocument/2006/relationships" xmlns:p="http://schemas.openxmlformats.org/presentationml/2006/main">
+  <p:cSld>
+    <p:spTree>
+      <p:nvGrpSpPr>
+        <p:cNvPr id="1" name=""/>
+        <p:cNvGrpSpPr/>
+        <p:nvPr/>
+      </p:nvGrpSpPr>
+      <p:grpSpPr>
+        <a:xfrm>
+          <a:off x="0" y="0"/>
+          <a:ext cx="0" cy="0"/>
+          <a:chOff x="0" y="0"/>
+          <a:chExt cx="0" cy="0"/>
+        </a:xfrm>
+      </p:grpSpPr>
+      <p:sp>
+        <p:nvSpPr>
+          <p:cNvPr id="2" name="Title 1">
+            <a:extLst>
+              <a:ext uri="{FF2B5EF4-FFF2-40B4-BE49-F238E27FC236}">
                 <a16:creationId xmlns:a16="http://schemas.microsoft.com/office/drawing/2014/main" id="{9F975768-465C-4958-A7BD-83598871C5EC}"/>
               </a:ext>
             </a:extLst>
@@ -7685,7 +8260,7 @@
 </p:sld>
 </file>
 
-<file path=ppt/slides/slide11.xml><?xml version="1.0" encoding="utf-8"?>
+<file path=ppt/slides/slide12.xml><?xml version="1.0" encoding="utf-8"?>
 <p:sld xmlns:a="http://schemas.openxmlformats.org/drawingml/2006/main" xmlns:r="http://schemas.openxmlformats.org/officeDocument/2006/relationships" xmlns:p="http://schemas.openxmlformats.org/presentationml/2006/main">
   <p:cSld>
     <p:spTree>
@@ -8761,6 +9336,719 @@
           </a:p>
         </p:txBody>
       </p:sp>
+    </p:spTree>
+    <p:extLst>
+      <p:ext uri="{BB962C8B-B14F-4D97-AF65-F5344CB8AC3E}">
+        <p14:creationId xmlns:p14="http://schemas.microsoft.com/office/powerpoint/2010/main" val="3355472486"/>
+      </p:ext>
+    </p:extLst>
+  </p:cSld>
+  <p:clrMapOvr>
+    <a:masterClrMapping/>
+  </p:clrMapOvr>
+</p:sld>
+</file>
+
+<file path=ppt/slides/slide4.xml><?xml version="1.0" encoding="utf-8"?>
+<p:sld xmlns:a="http://schemas.openxmlformats.org/drawingml/2006/main" xmlns:r="http://schemas.openxmlformats.org/officeDocument/2006/relationships" xmlns:p="http://schemas.openxmlformats.org/presentationml/2006/main">
+  <p:cSld>
+    <p:bg>
+      <p:bgPr>
+        <a:blipFill rotWithShape="1">
+          <a:blip r:embed="rId3">
+            <a:duotone>
+              <a:schemeClr val="bg2">
+                <a:shade val="69000"/>
+                <a:hueMod val="91000"/>
+                <a:satMod val="164000"/>
+                <a:lumMod val="74000"/>
+              </a:schemeClr>
+              <a:schemeClr val="bg2">
+                <a:hueMod val="124000"/>
+                <a:satMod val="140000"/>
+                <a:lumMod val="142000"/>
+              </a:schemeClr>
+            </a:duotone>
+          </a:blip>
+          <a:stretch/>
+        </a:blipFill>
+        <a:effectLst/>
+      </p:bgPr>
+    </p:bg>
+    <p:spTree>
+      <p:nvGrpSpPr>
+        <p:cNvPr id="1" name=""/>
+        <p:cNvGrpSpPr/>
+        <p:nvPr/>
+      </p:nvGrpSpPr>
+      <p:grpSpPr>
+        <a:xfrm>
+          <a:off x="0" y="0"/>
+          <a:ext cx="0" cy="0"/>
+          <a:chOff x="0" y="0"/>
+          <a:chExt cx="0" cy="0"/>
+        </a:xfrm>
+      </p:grpSpPr>
+      <p:pic>
+        <p:nvPicPr>
+          <p:cNvPr id="73" name="Picture 72">
+            <a:extLst>
+              <a:ext uri="{FF2B5EF4-FFF2-40B4-BE49-F238E27FC236}">
+                <a16:creationId xmlns:a16="http://schemas.microsoft.com/office/drawing/2014/main" id="{26E32CE1-D113-412E-9933-113646E21F53}"/>
+              </a:ext>
+              <a:ext uri="{C183D7F6-B498-43B3-948B-1728B52AA6E4}">
+                <adec:decorative xmlns:adec="http://schemas.microsoft.com/office/drawing/2017/decorative" val="1"/>
+              </a:ext>
+            </a:extLst>
+          </p:cNvPr>
+          <p:cNvPicPr>
+            <a:picLocks noGrp="1" noRot="1" noChangeAspect="1" noMove="1" noResize="1" noEditPoints="1" noAdjustHandles="1" noChangeArrowheads="1" noChangeShapeType="1" noCrop="1"/>
+          </p:cNvPicPr>
+          <p:nvPr>
+            <p:extLst>
+              <p:ext uri="{386F3935-93C4-4BCD-93E2-E3B085C9AB24}">
+                <p16:designElem xmlns:p16="http://schemas.microsoft.com/office/powerpoint/2015/main" val="1"/>
+              </p:ext>
+            </p:extLst>
+          </p:nvPr>
+        </p:nvPicPr>
+        <p:blipFill rotWithShape="1">
+          <a:blip r:embed="rId4">
+            <a:extLst>
+              <a:ext uri="{28A0092B-C50C-407E-A947-70E740481C1C}">
+                <a14:useLocalDpi xmlns:a14="http://schemas.microsoft.com/office/drawing/2010/main" val="0"/>
+              </a:ext>
+            </a:extLst>
+          </a:blip>
+          <a:srcRect l="3644"/>
+          <a:stretch/>
+        </p:blipFill>
+        <p:spPr>
+          <a:xfrm>
+            <a:off x="0" y="2669685"/>
+            <a:ext cx="4035669" cy="4188315"/>
+          </a:xfrm>
+          <a:prstGeom prst="rect">
+            <a:avLst/>
+          </a:prstGeom>
+        </p:spPr>
+      </p:pic>
+      <p:pic>
+        <p:nvPicPr>
+          <p:cNvPr id="75" name="Picture 74">
+            <a:extLst>
+              <a:ext uri="{FF2B5EF4-FFF2-40B4-BE49-F238E27FC236}">
+                <a16:creationId xmlns:a16="http://schemas.microsoft.com/office/drawing/2014/main" id="{117B7C8B-175B-4009-808B-9F66FD108AB3}"/>
+              </a:ext>
+              <a:ext uri="{C183D7F6-B498-43B3-948B-1728B52AA6E4}">
+                <adec:decorative xmlns:adec="http://schemas.microsoft.com/office/drawing/2017/decorative" val="1"/>
+              </a:ext>
+            </a:extLst>
+          </p:cNvPr>
+          <p:cNvPicPr>
+            <a:picLocks noGrp="1" noRot="1" noChangeAspect="1" noMove="1" noResize="1" noEditPoints="1" noAdjustHandles="1" noChangeArrowheads="1" noChangeShapeType="1" noCrop="1"/>
+          </p:cNvPicPr>
+          <p:nvPr>
+            <p:extLst>
+              <p:ext uri="{386F3935-93C4-4BCD-93E2-E3B085C9AB24}">
+                <p16:designElem xmlns:p16="http://schemas.microsoft.com/office/powerpoint/2015/main" val="1"/>
+              </p:ext>
+            </p:extLst>
+          </p:nvPr>
+        </p:nvPicPr>
+        <p:blipFill rotWithShape="1">
+          <a:blip r:embed="rId5">
+            <a:extLst>
+              <a:ext uri="{28A0092B-C50C-407E-A947-70E740481C1C}">
+                <a14:useLocalDpi xmlns:a14="http://schemas.microsoft.com/office/drawing/2010/main" val="0"/>
+              </a:ext>
+            </a:extLst>
+          </a:blip>
+          <a:srcRect l="35640"/>
+          <a:stretch/>
+        </p:blipFill>
+        <p:spPr>
+          <a:xfrm>
+            <a:off x="0" y="2892347"/>
+            <a:ext cx="1522412" cy="2365453"/>
+          </a:xfrm>
+          <a:prstGeom prst="rect">
+            <a:avLst/>
+          </a:prstGeom>
+        </p:spPr>
+      </p:pic>
+      <p:sp>
+        <p:nvSpPr>
+          <p:cNvPr id="77" name="Oval 76">
+            <a:extLst>
+              <a:ext uri="{FF2B5EF4-FFF2-40B4-BE49-F238E27FC236}">
+                <a16:creationId xmlns:a16="http://schemas.microsoft.com/office/drawing/2014/main" id="{FE5ECD52-6A23-4FF4-8C32-7B5DE9973ADA}"/>
+              </a:ext>
+              <a:ext uri="{C183D7F6-B498-43B3-948B-1728B52AA6E4}">
+                <adec:decorative xmlns:adec="http://schemas.microsoft.com/office/drawing/2017/decorative" val="1"/>
+              </a:ext>
+            </a:extLst>
+          </p:cNvPr>
+          <p:cNvSpPr>
+            <a:spLocks noGrp="1" noRot="1" noChangeAspect="1" noMove="1" noResize="1" noEditPoints="1" noAdjustHandles="1" noChangeArrowheads="1" noChangeShapeType="1" noTextEdit="1"/>
+          </p:cNvSpPr>
+          <p:nvPr>
+            <p:extLst>
+              <p:ext uri="{386F3935-93C4-4BCD-93E2-E3B085C9AB24}">
+                <p16:designElem xmlns:p16="http://schemas.microsoft.com/office/powerpoint/2015/main" val="1"/>
+              </p:ext>
+            </p:extLst>
+          </p:nvPr>
+        </p:nvSpPr>
+        <p:spPr>
+          <a:xfrm>
+            <a:off x="8609012" y="1676400"/>
+            <a:ext cx="2819400" cy="2819400"/>
+          </a:xfrm>
+          <a:prstGeom prst="ellipse">
+            <a:avLst/>
+          </a:prstGeom>
+          <a:gradFill flip="none" rotWithShape="1">
+            <a:gsLst>
+              <a:gs pos="0">
+                <a:schemeClr val="accent5">
+                  <a:alpha val="7000"/>
+                </a:schemeClr>
+              </a:gs>
+              <a:gs pos="69000">
+                <a:schemeClr val="accent5">
+                  <a:alpha val="0"/>
+                </a:schemeClr>
+              </a:gs>
+              <a:gs pos="36000">
+                <a:schemeClr val="accent5">
+                  <a:alpha val="6000"/>
+                </a:schemeClr>
+              </a:gs>
+            </a:gsLst>
+            <a:path path="circle">
+              <a:fillToRect l="50000" t="50000" r="50000" b="50000"/>
+            </a:path>
+            <a:tileRect/>
+          </a:gradFill>
+          <a:ln>
+            <a:noFill/>
+          </a:ln>
+          <a:effectLst/>
+        </p:spPr>
+        <p:style>
+          <a:lnRef idx="1">
+            <a:schemeClr val="accent1"/>
+          </a:lnRef>
+          <a:fillRef idx="3">
+            <a:schemeClr val="accent1"/>
+          </a:fillRef>
+          <a:effectRef idx="2">
+            <a:schemeClr val="accent1"/>
+          </a:effectRef>
+          <a:fontRef idx="minor">
+            <a:schemeClr val="lt1"/>
+          </a:fontRef>
+        </p:style>
+      </p:sp>
+      <p:pic>
+        <p:nvPicPr>
+          <p:cNvPr id="79" name="Picture 78">
+            <a:extLst>
+              <a:ext uri="{FF2B5EF4-FFF2-40B4-BE49-F238E27FC236}">
+                <a16:creationId xmlns:a16="http://schemas.microsoft.com/office/drawing/2014/main" id="{5C3F2B96-5F34-41C9-8E37-A9CD279A4270}"/>
+              </a:ext>
+              <a:ext uri="{C183D7F6-B498-43B3-948B-1728B52AA6E4}">
+                <adec:decorative xmlns:adec="http://schemas.microsoft.com/office/drawing/2017/decorative" val="1"/>
+              </a:ext>
+            </a:extLst>
+          </p:cNvPr>
+          <p:cNvPicPr>
+            <a:picLocks noGrp="1" noRot="1" noChangeAspect="1" noMove="1" noResize="1" noEditPoints="1" noAdjustHandles="1" noChangeArrowheads="1" noChangeShapeType="1" noCrop="1"/>
+          </p:cNvPicPr>
+          <p:nvPr>
+            <p:extLst>
+              <p:ext uri="{386F3935-93C4-4BCD-93E2-E3B085C9AB24}">
+                <p16:designElem xmlns:p16="http://schemas.microsoft.com/office/powerpoint/2015/main" val="1"/>
+              </p:ext>
+            </p:extLst>
+          </p:nvPr>
+        </p:nvPicPr>
+        <p:blipFill rotWithShape="1">
+          <a:blip r:embed="rId6">
+            <a:extLst>
+              <a:ext uri="{28A0092B-C50C-407E-A947-70E740481C1C}">
+                <a14:useLocalDpi xmlns:a14="http://schemas.microsoft.com/office/drawing/2010/main" val="0"/>
+              </a:ext>
+            </a:extLst>
+          </a:blip>
+          <a:srcRect t="28813"/>
+          <a:stretch/>
+        </p:blipFill>
+        <p:spPr>
+          <a:xfrm>
+            <a:off x="7999412" y="0"/>
+            <a:ext cx="1603387" cy="1141407"/>
+          </a:xfrm>
+          <a:prstGeom prst="rect">
+            <a:avLst/>
+          </a:prstGeom>
+        </p:spPr>
+      </p:pic>
+      <p:pic>
+        <p:nvPicPr>
+          <p:cNvPr id="81" name="Picture 80">
+            <a:extLst>
+              <a:ext uri="{FF2B5EF4-FFF2-40B4-BE49-F238E27FC236}">
+                <a16:creationId xmlns:a16="http://schemas.microsoft.com/office/drawing/2014/main" id="{9A4E02BF-4F0E-44E2-A489-075900B7866C}"/>
+              </a:ext>
+              <a:ext uri="{C183D7F6-B498-43B3-948B-1728B52AA6E4}">
+                <adec:decorative xmlns:adec="http://schemas.microsoft.com/office/drawing/2017/decorative" val="1"/>
+              </a:ext>
+            </a:extLst>
+          </p:cNvPr>
+          <p:cNvPicPr>
+            <a:picLocks noGrp="1" noRot="1" noChangeAspect="1" noMove="1" noResize="1" noEditPoints="1" noAdjustHandles="1" noChangeArrowheads="1" noChangeShapeType="1" noCrop="1"/>
+          </p:cNvPicPr>
+          <p:nvPr>
+            <p:extLst>
+              <p:ext uri="{386F3935-93C4-4BCD-93E2-E3B085C9AB24}">
+                <p16:designElem xmlns:p16="http://schemas.microsoft.com/office/powerpoint/2015/main" val="1"/>
+              </p:ext>
+            </p:extLst>
+          </p:nvPr>
+        </p:nvPicPr>
+        <p:blipFill rotWithShape="1">
+          <a:blip r:embed="rId7">
+            <a:extLst>
+              <a:ext uri="{28A0092B-C50C-407E-A947-70E740481C1C}">
+                <a14:useLocalDpi xmlns:a14="http://schemas.microsoft.com/office/drawing/2010/main" val="0"/>
+              </a:ext>
+            </a:extLst>
+          </a:blip>
+          <a:srcRect b="23320"/>
+          <a:stretch/>
+        </p:blipFill>
+        <p:spPr>
+          <a:xfrm>
+            <a:off x="8609012" y="6096000"/>
+            <a:ext cx="993734" cy="762000"/>
+          </a:xfrm>
+          <a:prstGeom prst="rect">
+            <a:avLst/>
+          </a:prstGeom>
+        </p:spPr>
+      </p:pic>
+      <p:sp>
+        <p:nvSpPr>
+          <p:cNvPr id="83" name="Rectangle 82">
+            <a:extLst>
+              <a:ext uri="{FF2B5EF4-FFF2-40B4-BE49-F238E27FC236}">
+                <a16:creationId xmlns:a16="http://schemas.microsoft.com/office/drawing/2014/main" id="{45624C63-3CCA-4EA6-B822-6E710A82062B}"/>
+              </a:ext>
+              <a:ext uri="{C183D7F6-B498-43B3-948B-1728B52AA6E4}">
+                <adec:decorative xmlns:adec="http://schemas.microsoft.com/office/drawing/2017/decorative" val="1"/>
+              </a:ext>
+            </a:extLst>
+          </p:cNvPr>
+          <p:cNvSpPr>
+            <a:spLocks noGrp="1" noRot="1" noChangeAspect="1" noMove="1" noResize="1" noEditPoints="1" noAdjustHandles="1" noChangeArrowheads="1" noChangeShapeType="1" noTextEdit="1"/>
+          </p:cNvSpPr>
+          <p:nvPr>
+            <p:extLst>
+              <p:ext uri="{386F3935-93C4-4BCD-93E2-E3B085C9AB24}">
+                <p16:designElem xmlns:p16="http://schemas.microsoft.com/office/powerpoint/2015/main" val="1"/>
+              </p:ext>
+            </p:extLst>
+          </p:nvPr>
+        </p:nvSpPr>
+        <p:spPr>
+          <a:xfrm>
+            <a:off x="10437812" y="0"/>
+            <a:ext cx="685800" cy="1143000"/>
+          </a:xfrm>
+          <a:prstGeom prst="rect">
+            <a:avLst/>
+          </a:prstGeom>
+          <a:solidFill>
+            <a:schemeClr val="accent1"/>
+          </a:solidFill>
+          <a:ln>
+            <a:noFill/>
+          </a:ln>
+        </p:spPr>
+        <p:style>
+          <a:lnRef idx="1">
+            <a:schemeClr val="accent1"/>
+          </a:lnRef>
+          <a:fillRef idx="3">
+            <a:schemeClr val="accent1"/>
+          </a:fillRef>
+          <a:effectRef idx="2">
+            <a:schemeClr val="accent1"/>
+          </a:effectRef>
+          <a:fontRef idx="minor">
+            <a:schemeClr val="lt1"/>
+          </a:fontRef>
+        </p:style>
+      </p:sp>
+      <p:sp>
+        <p:nvSpPr>
+          <p:cNvPr id="2" name="Title 1">
+            <a:extLst>
+              <a:ext uri="{FF2B5EF4-FFF2-40B4-BE49-F238E27FC236}">
+                <a16:creationId xmlns:a16="http://schemas.microsoft.com/office/drawing/2014/main" id="{083C8E45-24D2-44E6-B120-C50AD8FAC2CD}"/>
+              </a:ext>
+            </a:extLst>
+          </p:cNvPr>
+          <p:cNvSpPr>
+            <a:spLocks noGrp="1"/>
+          </p:cNvSpPr>
+          <p:nvPr>
+            <p:ph type="title"/>
+          </p:nvPr>
+        </p:nvSpPr>
+        <p:spPr>
+          <a:xfrm>
+            <a:off x="5282381" y="629266"/>
+            <a:ext cx="4767471" cy="1641986"/>
+          </a:xfrm>
+        </p:spPr>
+        <p:txBody>
+          <a:bodyPr vert="horz" lIns="91440" tIns="45720" rIns="91440" bIns="45720" rtlCol="0" anchor="t">
+            <a:normAutofit/>
+          </a:bodyPr>
+          <a:lstStyle/>
+          <a:p>
+            <a:r>
+              <a:rPr lang="en-US"/>
+              <a:t>Consultant Journey</a:t>
+            </a:r>
+          </a:p>
+        </p:txBody>
+      </p:sp>
+      <p:pic>
+        <p:nvPicPr>
+          <p:cNvPr id="1028" name="Picture 4" descr="8 books to read in the time of the coronavirus | PBS NewsHour">
+            <a:extLst>
+              <a:ext uri="{FF2B5EF4-FFF2-40B4-BE49-F238E27FC236}">
+                <a16:creationId xmlns:a16="http://schemas.microsoft.com/office/drawing/2014/main" id="{B95D7FD2-1A5B-41D9-8723-E613B8CF7B9D}"/>
+              </a:ext>
+            </a:extLst>
+          </p:cNvPr>
+          <p:cNvPicPr>
+            <a:picLocks noGrp="1" noChangeAspect="1" noChangeArrowheads="1"/>
+          </p:cNvPicPr>
+          <p:nvPr>
+            <p:ph sz="half" idx="2"/>
+          </p:nvPr>
+        </p:nvPicPr>
+        <p:blipFill rotWithShape="1">
+          <a:blip r:embed="rId8">
+            <a:extLst>
+              <a:ext uri="{28A0092B-C50C-407E-A947-70E740481C1C}">
+                <a14:useLocalDpi xmlns:a14="http://schemas.microsoft.com/office/drawing/2010/main" val="0"/>
+              </a:ext>
+            </a:extLst>
+          </a:blip>
+          <a:srcRect l="22082" r="32807" b="-1"/>
+          <a:stretch/>
+        </p:blipFill>
+        <p:spPr bwMode="auto">
+          <a:xfrm>
+            <a:off x="-1" y="10"/>
+            <a:ext cx="4634680" cy="6857990"/>
+          </a:xfrm>
+          <a:prstGeom prst="rect">
+            <a:avLst/>
+          </a:prstGeom>
+          <a:noFill/>
+          <a:extLst>
+            <a:ext uri="{909E8E84-426E-40DD-AFC4-6F175D3DCCD1}">
+              <a14:hiddenFill xmlns:a14="http://schemas.microsoft.com/office/drawing/2010/main">
+                <a:solidFill>
+                  <a:srgbClr val="FFFFFF"/>
+                </a:solidFill>
+              </a14:hiddenFill>
+            </a:ext>
+          </a:extLst>
+        </p:spPr>
+      </p:pic>
+      <p:sp>
+        <p:nvSpPr>
+          <p:cNvPr id="11" name="Content Placeholder 3">
+            <a:extLst>
+              <a:ext uri="{FF2B5EF4-FFF2-40B4-BE49-F238E27FC236}">
+                <a16:creationId xmlns:a16="http://schemas.microsoft.com/office/drawing/2014/main" id="{24ADD646-3E90-4D3B-849D-1D906E1F0298}"/>
+              </a:ext>
+            </a:extLst>
+          </p:cNvPr>
+          <p:cNvSpPr txBox="1">
+            <a:spLocks/>
+          </p:cNvSpPr>
+          <p:nvPr/>
+        </p:nvSpPr>
+        <p:spPr>
+          <a:xfrm>
+            <a:off x="8615952" y="4049907"/>
+            <a:ext cx="3322523" cy="2178828"/>
+          </a:xfrm>
+          <a:prstGeom prst="rect">
+            <a:avLst/>
+          </a:prstGeom>
+        </p:spPr>
+        <p:txBody>
+          <a:bodyPr vert="horz" lIns="91440" tIns="45720" rIns="91440" bIns="45720" rtlCol="0">
+            <a:normAutofit/>
+          </a:bodyPr>
+          <a:lstStyle>
+            <a:lvl1pPr marL="342900" indent="-342900" algn="l" defTabSz="457200" rtl="0" eaLnBrk="1" latinLnBrk="0" hangingPunct="1">
+              <a:spcBef>
+                <a:spcPts val="1000"/>
+              </a:spcBef>
+              <a:spcAft>
+                <a:spcPts val="0"/>
+              </a:spcAft>
+              <a:buClr>
+                <a:schemeClr val="accent1">
+                  <a:lumMod val="60000"/>
+                  <a:lumOff val="40000"/>
+                </a:schemeClr>
+              </a:buClr>
+              <a:buSzPct val="80000"/>
+              <a:buFont typeface="Wingdings 3" charset="2"/>
+              <a:buChar char=""/>
+              <a:defRPr sz="1800" b="0" i="0" kern="1200">
+                <a:solidFill>
+                  <a:schemeClr val="tx1"/>
+                </a:solidFill>
+                <a:latin typeface="+mj-lt"/>
+                <a:ea typeface="+mj-ea"/>
+                <a:cs typeface="+mj-cs"/>
+              </a:defRPr>
+            </a:lvl1pPr>
+            <a:lvl2pPr marL="742950" indent="-285750" algn="l" defTabSz="457200" rtl="0" eaLnBrk="1" latinLnBrk="0" hangingPunct="1">
+              <a:spcBef>
+                <a:spcPts val="1000"/>
+              </a:spcBef>
+              <a:spcAft>
+                <a:spcPts val="0"/>
+              </a:spcAft>
+              <a:buClr>
+                <a:schemeClr val="accent1">
+                  <a:lumMod val="60000"/>
+                  <a:lumOff val="40000"/>
+                </a:schemeClr>
+              </a:buClr>
+              <a:buSzPct val="80000"/>
+              <a:buFont typeface="Wingdings 3" charset="2"/>
+              <a:buChar char=""/>
+              <a:defRPr sz="1600" b="0" i="0" kern="1200">
+                <a:solidFill>
+                  <a:schemeClr val="tx1"/>
+                </a:solidFill>
+                <a:latin typeface="+mj-lt"/>
+                <a:ea typeface="+mj-ea"/>
+                <a:cs typeface="+mj-cs"/>
+              </a:defRPr>
+            </a:lvl2pPr>
+            <a:lvl3pPr marL="1143000" indent="-228600" algn="l" defTabSz="457200" rtl="0" eaLnBrk="1" latinLnBrk="0" hangingPunct="1">
+              <a:spcBef>
+                <a:spcPts val="1000"/>
+              </a:spcBef>
+              <a:spcAft>
+                <a:spcPts val="0"/>
+              </a:spcAft>
+              <a:buClr>
+                <a:schemeClr val="accent1">
+                  <a:lumMod val="60000"/>
+                  <a:lumOff val="40000"/>
+                </a:schemeClr>
+              </a:buClr>
+              <a:buSzPct val="80000"/>
+              <a:buFont typeface="Wingdings 3" charset="2"/>
+              <a:buChar char=""/>
+              <a:defRPr sz="1400" b="0" i="0" kern="1200">
+                <a:solidFill>
+                  <a:schemeClr val="tx1"/>
+                </a:solidFill>
+                <a:latin typeface="+mj-lt"/>
+                <a:ea typeface="+mj-ea"/>
+                <a:cs typeface="+mj-cs"/>
+              </a:defRPr>
+            </a:lvl3pPr>
+            <a:lvl4pPr marL="1600200" indent="-228600" algn="l" defTabSz="457200" rtl="0" eaLnBrk="1" latinLnBrk="0" hangingPunct="1">
+              <a:spcBef>
+                <a:spcPts val="1000"/>
+              </a:spcBef>
+              <a:spcAft>
+                <a:spcPts val="0"/>
+              </a:spcAft>
+              <a:buClr>
+                <a:schemeClr val="accent1">
+                  <a:lumMod val="60000"/>
+                  <a:lumOff val="40000"/>
+                </a:schemeClr>
+              </a:buClr>
+              <a:buSzPct val="80000"/>
+              <a:buFont typeface="Wingdings 3" charset="2"/>
+              <a:buChar char=""/>
+              <a:defRPr sz="1200" b="0" i="0" kern="1200">
+                <a:solidFill>
+                  <a:schemeClr val="tx1"/>
+                </a:solidFill>
+                <a:latin typeface="+mj-lt"/>
+                <a:ea typeface="+mj-ea"/>
+                <a:cs typeface="+mj-cs"/>
+              </a:defRPr>
+            </a:lvl4pPr>
+            <a:lvl5pPr marL="2057400" indent="-228600" algn="l" defTabSz="457200" rtl="0" eaLnBrk="1" latinLnBrk="0" hangingPunct="1">
+              <a:spcBef>
+                <a:spcPts val="1000"/>
+              </a:spcBef>
+              <a:spcAft>
+                <a:spcPts val="0"/>
+              </a:spcAft>
+              <a:buClr>
+                <a:schemeClr val="accent1">
+                  <a:lumMod val="60000"/>
+                  <a:lumOff val="40000"/>
+                </a:schemeClr>
+              </a:buClr>
+              <a:buSzPct val="80000"/>
+              <a:buFont typeface="Wingdings 3" charset="2"/>
+              <a:buChar char=""/>
+              <a:defRPr sz="1200" b="0" i="0" kern="1200">
+                <a:solidFill>
+                  <a:schemeClr val="tx1"/>
+                </a:solidFill>
+                <a:latin typeface="+mj-lt"/>
+                <a:ea typeface="+mj-ea"/>
+                <a:cs typeface="+mj-cs"/>
+              </a:defRPr>
+            </a:lvl5pPr>
+            <a:lvl6pPr marL="2514600" indent="-228600" algn="l" defTabSz="457200" rtl="0" eaLnBrk="1" latinLnBrk="0" hangingPunct="1">
+              <a:spcBef>
+                <a:spcPts val="1000"/>
+              </a:spcBef>
+              <a:spcAft>
+                <a:spcPts val="0"/>
+              </a:spcAft>
+              <a:buClr>
+                <a:schemeClr val="accent1">
+                  <a:lumMod val="60000"/>
+                  <a:lumOff val="40000"/>
+                </a:schemeClr>
+              </a:buClr>
+              <a:buSzPct val="80000"/>
+              <a:buFont typeface="Wingdings 3" charset="2"/>
+              <a:buChar char=""/>
+              <a:defRPr sz="1200" b="0" i="0" kern="1200">
+                <a:solidFill>
+                  <a:schemeClr val="tx1"/>
+                </a:solidFill>
+                <a:latin typeface="+mj-lt"/>
+                <a:ea typeface="+mj-ea"/>
+                <a:cs typeface="+mj-cs"/>
+              </a:defRPr>
+            </a:lvl6pPr>
+            <a:lvl7pPr marL="2971800" indent="-228600" algn="l" defTabSz="457200" rtl="0" eaLnBrk="1" latinLnBrk="0" hangingPunct="1">
+              <a:spcBef>
+                <a:spcPts val="1000"/>
+              </a:spcBef>
+              <a:spcAft>
+                <a:spcPts val="0"/>
+              </a:spcAft>
+              <a:buClr>
+                <a:schemeClr val="accent1">
+                  <a:lumMod val="60000"/>
+                  <a:lumOff val="40000"/>
+                </a:schemeClr>
+              </a:buClr>
+              <a:buSzPct val="80000"/>
+              <a:buFont typeface="Wingdings 3" charset="2"/>
+              <a:buChar char=""/>
+              <a:defRPr sz="1200" b="0" i="0" kern="1200">
+                <a:solidFill>
+                  <a:schemeClr val="tx1"/>
+                </a:solidFill>
+                <a:latin typeface="+mj-lt"/>
+                <a:ea typeface="+mj-ea"/>
+                <a:cs typeface="+mj-cs"/>
+              </a:defRPr>
+            </a:lvl7pPr>
+            <a:lvl8pPr marL="3429000" indent="-228600" algn="l" defTabSz="457200" rtl="0" eaLnBrk="1" latinLnBrk="0" hangingPunct="1">
+              <a:spcBef>
+                <a:spcPts val="1000"/>
+              </a:spcBef>
+              <a:spcAft>
+                <a:spcPts val="0"/>
+              </a:spcAft>
+              <a:buClr>
+                <a:schemeClr val="accent1">
+                  <a:lumMod val="60000"/>
+                  <a:lumOff val="40000"/>
+                </a:schemeClr>
+              </a:buClr>
+              <a:buSzPct val="80000"/>
+              <a:buFont typeface="Wingdings 3" charset="2"/>
+              <a:buChar char=""/>
+              <a:defRPr sz="1200" b="0" i="0" kern="1200">
+                <a:solidFill>
+                  <a:schemeClr val="tx1"/>
+                </a:solidFill>
+                <a:latin typeface="+mj-lt"/>
+                <a:ea typeface="+mj-ea"/>
+                <a:cs typeface="+mj-cs"/>
+              </a:defRPr>
+            </a:lvl8pPr>
+            <a:lvl9pPr marL="3886200" indent="-228600" algn="l" defTabSz="457200" rtl="0" eaLnBrk="1" latinLnBrk="0" hangingPunct="1">
+              <a:spcBef>
+                <a:spcPts val="1000"/>
+              </a:spcBef>
+              <a:spcAft>
+                <a:spcPts val="0"/>
+              </a:spcAft>
+              <a:buClr>
+                <a:schemeClr val="accent1">
+                  <a:lumMod val="60000"/>
+                  <a:lumOff val="40000"/>
+                </a:schemeClr>
+              </a:buClr>
+              <a:buSzPct val="80000"/>
+              <a:buFont typeface="Wingdings 3" charset="2"/>
+              <a:buChar char=""/>
+              <a:defRPr sz="1200" b="0" i="0" kern="1200">
+                <a:solidFill>
+                  <a:schemeClr val="tx1"/>
+                </a:solidFill>
+                <a:latin typeface="+mj-lt"/>
+                <a:ea typeface="+mj-ea"/>
+                <a:cs typeface="+mj-cs"/>
+              </a:defRPr>
+            </a:lvl9pPr>
+          </a:lstStyle>
+          <a:p>
+            <a:pPr marL="0" indent="0">
+              <a:buFont typeface="Wingdings 3" charset="2"/>
+              <a:buNone/>
+            </a:pPr>
+            <a:endParaRPr lang="en-US" dirty="0"/>
+          </a:p>
+          <a:p>
+            <a:r>
+              <a:rPr lang="en-US" dirty="0"/>
+              <a:t>Risk Assessment</a:t>
+            </a:r>
+          </a:p>
+          <a:p>
+            <a:endParaRPr lang="en-US" dirty="0"/>
+          </a:p>
+          <a:p>
+            <a:endParaRPr lang="en-US" dirty="0"/>
+          </a:p>
+        </p:txBody>
+      </p:sp>
       <p:pic>
         <p:nvPicPr>
           <p:cNvPr id="3" name="Picture 2">
@@ -8783,7 +10071,7 @@
         </p:blipFill>
         <p:spPr>
           <a:xfrm>
-            <a:off x="1271587" y="1504950"/>
+            <a:off x="1271587" y="2247900"/>
             <a:ext cx="9648825" cy="3848100"/>
           </a:xfrm>
           <a:prstGeom prst="rect">
@@ -8808,7 +10096,7 @@
     </p:spTree>
     <p:extLst>
       <p:ext uri="{BB962C8B-B14F-4D97-AF65-F5344CB8AC3E}">
-        <p14:creationId xmlns:p14="http://schemas.microsoft.com/office/powerpoint/2010/main" val="3355472486"/>
+        <p14:creationId xmlns:p14="http://schemas.microsoft.com/office/powerpoint/2010/main" val="1770992667"/>
       </p:ext>
     </p:extLst>
   </p:cSld>
@@ -8893,7 +10181,7 @@
 </p:sld>
 </file>
 
-<file path=ppt/slides/slide4.xml><?xml version="1.0" encoding="utf-8"?>
+<file path=ppt/slides/slide5.xml><?xml version="1.0" encoding="utf-8"?>
 <p:sld xmlns:a="http://schemas.openxmlformats.org/drawingml/2006/main" xmlns:r="http://schemas.openxmlformats.org/officeDocument/2006/relationships" xmlns:p="http://schemas.openxmlformats.org/presentationml/2006/main">
   <p:cSld>
     <p:bg>
@@ -10068,7 +11356,7 @@
 </p:sld>
 </file>
 
-<file path=ppt/slides/slide5.xml><?xml version="1.0" encoding="utf-8"?>
+<file path=ppt/slides/slide6.xml><?xml version="1.0" encoding="utf-8"?>
 <p:sld xmlns:a="http://schemas.openxmlformats.org/drawingml/2006/main" xmlns:r="http://schemas.openxmlformats.org/officeDocument/2006/relationships" xmlns:p="http://schemas.openxmlformats.org/presentationml/2006/main">
   <p:cSld>
     <p:bg>
@@ -10608,7 +11896,7 @@
 </p:sld>
 </file>
 
-<file path=ppt/slides/slide6.xml><?xml version="1.0" encoding="utf-8"?>
+<file path=ppt/slides/slide7.xml><?xml version="1.0" encoding="utf-8"?>
 <p:sld xmlns:a="http://schemas.openxmlformats.org/drawingml/2006/main" xmlns:r="http://schemas.openxmlformats.org/officeDocument/2006/relationships" xmlns:p="http://schemas.openxmlformats.org/presentationml/2006/main">
   <p:cSld>
     <p:spTree>
@@ -11247,7 +12535,7 @@
 </p:sld>
 </file>
 
-<file path=ppt/slides/slide7.xml><?xml version="1.0" encoding="utf-8"?>
+<file path=ppt/slides/slide8.xml><?xml version="1.0" encoding="utf-8"?>
 <p:sld xmlns:a="http://schemas.openxmlformats.org/drawingml/2006/main" xmlns:r="http://schemas.openxmlformats.org/officeDocument/2006/relationships" xmlns:p="http://schemas.openxmlformats.org/presentationml/2006/main">
   <p:cSld>
     <p:spTree>
@@ -11305,7 +12593,7 @@
 </p:sld>
 </file>
 
-<file path=ppt/slides/slide8.xml><?xml version="1.0" encoding="utf-8"?>
+<file path=ppt/slides/slide9.xml><?xml version="1.0" encoding="utf-8"?>
 <p:sld xmlns:a="http://schemas.openxmlformats.org/drawingml/2006/main" xmlns:r="http://schemas.openxmlformats.org/officeDocument/2006/relationships" xmlns:p="http://schemas.openxmlformats.org/presentationml/2006/main">
   <p:cSld>
     <p:spTree>
@@ -11747,485 +13035,6 @@
     <p:bldLst>
       <p:bldP spid="6" grpId="0" build="p"/>
       <p:bldP spid="7" grpId="0" uiExpand="1" build="p"/>
-    </p:bldLst>
-  </p:timing>
-</p:sld>
-</file>
-
-<file path=ppt/slides/slide9.xml><?xml version="1.0" encoding="utf-8"?>
-<p:sld xmlns:a="http://schemas.openxmlformats.org/drawingml/2006/main" xmlns:r="http://schemas.openxmlformats.org/officeDocument/2006/relationships" xmlns:p="http://schemas.openxmlformats.org/presentationml/2006/main">
-  <p:cSld>
-    <p:spTree>
-      <p:nvGrpSpPr>
-        <p:cNvPr id="1" name=""/>
-        <p:cNvGrpSpPr/>
-        <p:nvPr/>
-      </p:nvGrpSpPr>
-      <p:grpSpPr>
-        <a:xfrm>
-          <a:off x="0" y="0"/>
-          <a:ext cx="0" cy="0"/>
-          <a:chOff x="0" y="0"/>
-          <a:chExt cx="0" cy="0"/>
-        </a:xfrm>
-      </p:grpSpPr>
-      <p:sp>
-        <p:nvSpPr>
-          <p:cNvPr id="2" name="Title 1">
-            <a:extLst>
-              <a:ext uri="{FF2B5EF4-FFF2-40B4-BE49-F238E27FC236}">
-                <a16:creationId xmlns:a16="http://schemas.microsoft.com/office/drawing/2014/main" id="{33FADC91-3227-4B2C-A891-810D1D8D4830}"/>
-              </a:ext>
-            </a:extLst>
-          </p:cNvPr>
-          <p:cNvSpPr>
-            <a:spLocks noGrp="1"/>
-          </p:cNvSpPr>
-          <p:nvPr>
-            <p:ph type="title"/>
-          </p:nvPr>
-        </p:nvSpPr>
-        <p:spPr/>
-        <p:txBody>
-          <a:bodyPr/>
-          <a:lstStyle/>
-          <a:p>
-            <a:r>
-              <a:rPr lang="en-GB" dirty="0"/>
-              <a:t>Sprint Retrospective</a:t>
-            </a:r>
-          </a:p>
-        </p:txBody>
-      </p:sp>
-      <p:sp>
-        <p:nvSpPr>
-          <p:cNvPr id="4" name="Text Placeholder 3">
-            <a:extLst>
-              <a:ext uri="{FF2B5EF4-FFF2-40B4-BE49-F238E27FC236}">
-                <a16:creationId xmlns:a16="http://schemas.microsoft.com/office/drawing/2014/main" id="{224B78D1-7C7E-4772-B4E4-DA6E2B079842}"/>
-              </a:ext>
-            </a:extLst>
-          </p:cNvPr>
-          <p:cNvSpPr>
-            <a:spLocks noGrp="1"/>
-          </p:cNvSpPr>
-          <p:nvPr>
-            <p:ph type="body" idx="1"/>
-          </p:nvPr>
-        </p:nvSpPr>
-        <p:spPr/>
-        <p:txBody>
-          <a:bodyPr/>
-          <a:lstStyle/>
-          <a:p>
-            <a:r>
-              <a:rPr lang="en-GB" dirty="0"/>
-              <a:t>Accomplishments</a:t>
-            </a:r>
-          </a:p>
-        </p:txBody>
-      </p:sp>
-      <p:sp>
-        <p:nvSpPr>
-          <p:cNvPr id="5" name="Content Placeholder 4">
-            <a:extLst>
-              <a:ext uri="{FF2B5EF4-FFF2-40B4-BE49-F238E27FC236}">
-                <a16:creationId xmlns:a16="http://schemas.microsoft.com/office/drawing/2014/main" id="{726371C0-EFB0-4C54-8CC4-6990B05A88FB}"/>
-              </a:ext>
-            </a:extLst>
-          </p:cNvPr>
-          <p:cNvSpPr>
-            <a:spLocks noGrp="1"/>
-          </p:cNvSpPr>
-          <p:nvPr>
-            <p:ph sz="half" idx="2"/>
-          </p:nvPr>
-        </p:nvSpPr>
-        <p:spPr/>
-        <p:txBody>
-          <a:bodyPr/>
-          <a:lstStyle/>
-          <a:p>
-            <a:r>
-              <a:rPr lang="en-GB" dirty="0"/>
-              <a:t>My product still bears some resemblance to my planning</a:t>
-            </a:r>
-          </a:p>
-          <a:p>
-            <a:pPr lvl="1"/>
-            <a:r>
-              <a:rPr lang="en-GB" dirty="0"/>
-              <a:t>Table structures</a:t>
-            </a:r>
-          </a:p>
-          <a:p>
-            <a:pPr lvl="1"/>
-            <a:r>
-              <a:rPr lang="en-GB" dirty="0"/>
-              <a:t>Features</a:t>
-            </a:r>
-          </a:p>
-          <a:p>
-            <a:r>
-              <a:rPr lang="en-GB" dirty="0"/>
-              <a:t>Task prioritisation seemed to work</a:t>
-            </a:r>
-          </a:p>
-          <a:p>
-            <a:pPr lvl="1"/>
-            <a:r>
-              <a:rPr lang="en-GB" dirty="0"/>
-              <a:t>Completing ‘small’ or ‘easier’ tasks, first</a:t>
-            </a:r>
-          </a:p>
-          <a:p>
-            <a:pPr lvl="1"/>
-            <a:r>
-              <a:rPr lang="en-GB" dirty="0"/>
-              <a:t>Moving on to more complex ones</a:t>
-            </a:r>
-          </a:p>
-        </p:txBody>
-      </p:sp>
-      <p:sp>
-        <p:nvSpPr>
-          <p:cNvPr id="6" name="Text Placeholder 5">
-            <a:extLst>
-              <a:ext uri="{FF2B5EF4-FFF2-40B4-BE49-F238E27FC236}">
-                <a16:creationId xmlns:a16="http://schemas.microsoft.com/office/drawing/2014/main" id="{3F1FE110-0C2B-424E-A353-1564B64614F0}"/>
-              </a:ext>
-            </a:extLst>
-          </p:cNvPr>
-          <p:cNvSpPr>
-            <a:spLocks noGrp="1"/>
-          </p:cNvSpPr>
-          <p:nvPr>
-            <p:ph type="body" sz="quarter" idx="3"/>
-          </p:nvPr>
-        </p:nvSpPr>
-        <p:spPr/>
-        <p:txBody>
-          <a:bodyPr/>
-          <a:lstStyle/>
-          <a:p>
-            <a:r>
-              <a:rPr lang="en-GB" dirty="0"/>
-              <a:t>Areas for Improvement</a:t>
-            </a:r>
-          </a:p>
-        </p:txBody>
-      </p:sp>
-      <p:sp>
-        <p:nvSpPr>
-          <p:cNvPr id="7" name="Content Placeholder 6">
-            <a:extLst>
-              <a:ext uri="{FF2B5EF4-FFF2-40B4-BE49-F238E27FC236}">
-                <a16:creationId xmlns:a16="http://schemas.microsoft.com/office/drawing/2014/main" id="{EACCE9D3-4FA2-4153-9FFC-1DEED30F4208}"/>
-              </a:ext>
-            </a:extLst>
-          </p:cNvPr>
-          <p:cNvSpPr>
-            <a:spLocks noGrp="1"/>
-          </p:cNvSpPr>
-          <p:nvPr>
-            <p:ph sz="quarter" idx="4"/>
-          </p:nvPr>
-        </p:nvSpPr>
-        <p:spPr/>
-        <p:txBody>
-          <a:bodyPr/>
-          <a:lstStyle/>
-          <a:p>
-            <a:r>
-              <a:rPr lang="en-GB" dirty="0"/>
-              <a:t>Could do with greater User-Story coverage</a:t>
-            </a:r>
-          </a:p>
-          <a:p>
-            <a:r>
-              <a:rPr lang="en-GB" dirty="0"/>
-              <a:t>Better Story-pointing</a:t>
-            </a:r>
-          </a:p>
-          <a:p>
-            <a:pPr lvl="1"/>
-            <a:r>
-              <a:rPr lang="en-GB" dirty="0"/>
-              <a:t>Would be useful for gauging time needed</a:t>
-            </a:r>
-          </a:p>
-          <a:p>
-            <a:r>
-              <a:rPr lang="en-GB" dirty="0"/>
-              <a:t>More detailed break-down of tasks</a:t>
-            </a:r>
-          </a:p>
-          <a:p>
-            <a:pPr lvl="1"/>
-            <a:r>
-              <a:rPr lang="en-GB" dirty="0"/>
-              <a:t>Creating / Updating tasks as changes in project occur</a:t>
-            </a:r>
-            <a:br>
-              <a:rPr lang="en-GB" dirty="0"/>
-            </a:br>
-            <a:r>
-              <a:rPr lang="en-GB" dirty="0" err="1"/>
-              <a:t>i.e</a:t>
-            </a:r>
-            <a:r>
-              <a:rPr lang="en-GB" dirty="0"/>
-              <a:t>: Viewing Order History</a:t>
-            </a:r>
-          </a:p>
-        </p:txBody>
-      </p:sp>
-    </p:spTree>
-    <p:extLst>
-      <p:ext uri="{BB962C8B-B14F-4D97-AF65-F5344CB8AC3E}">
-        <p14:creationId xmlns:p14="http://schemas.microsoft.com/office/powerpoint/2010/main" val="1545188398"/>
-      </p:ext>
-    </p:extLst>
-  </p:cSld>
-  <p:clrMapOvr>
-    <a:masterClrMapping/>
-  </p:clrMapOvr>
-  <p:timing>
-    <p:tnLst>
-      <p:par>
-        <p:cTn id="1" dur="indefinite" restart="never" nodeType="tmRoot">
-          <p:childTnLst>
-            <p:seq concurrent="1" nextAc="seek">
-              <p:cTn id="2" dur="indefinite" nodeType="mainSeq">
-                <p:childTnLst>
-                  <p:par>
-                    <p:cTn id="3" fill="hold">
-                      <p:stCondLst>
-                        <p:cond delay="indefinite"/>
-                      </p:stCondLst>
-                      <p:childTnLst>
-                        <p:par>
-                          <p:cTn id="4" fill="hold">
-                            <p:stCondLst>
-                              <p:cond delay="0"/>
-                            </p:stCondLst>
-                            <p:childTnLst>
-                              <p:par>
-                                <p:cTn id="5" presetID="1" presetClass="entr" presetSubtype="0" fill="hold" grpId="0" nodeType="clickEffect">
-                                  <p:stCondLst>
-                                    <p:cond delay="0"/>
-                                  </p:stCondLst>
-                                  <p:childTnLst>
-                                    <p:set>
-                                      <p:cBhvr>
-                                        <p:cTn id="6" dur="1" fill="hold">
-                                          <p:stCondLst>
-                                            <p:cond delay="0"/>
-                                          </p:stCondLst>
-                                        </p:cTn>
-                                        <p:tgtEl>
-                                          <p:spTgt spid="7">
-                                            <p:txEl>
-                                              <p:pRg st="0" end="0"/>
-                                            </p:txEl>
-                                          </p:spTgt>
-                                        </p:tgtEl>
-                                        <p:attrNameLst>
-                                          <p:attrName>style.visibility</p:attrName>
-                                        </p:attrNameLst>
-                                      </p:cBhvr>
-                                      <p:to>
-                                        <p:strVal val="visible"/>
-                                      </p:to>
-                                    </p:set>
-                                  </p:childTnLst>
-                                </p:cTn>
-                              </p:par>
-                              <p:par>
-                                <p:cTn id="7" presetID="1" presetClass="entr" presetSubtype="0" fill="hold" grpId="0" nodeType="withEffect">
-                                  <p:stCondLst>
-                                    <p:cond delay="0"/>
-                                  </p:stCondLst>
-                                  <p:childTnLst>
-                                    <p:set>
-                                      <p:cBhvr>
-                                        <p:cTn id="8" dur="1" fill="hold">
-                                          <p:stCondLst>
-                                            <p:cond delay="0"/>
-                                          </p:stCondLst>
-                                        </p:cTn>
-                                        <p:tgtEl>
-                                          <p:spTgt spid="7">
-                                            <p:txEl>
-                                              <p:pRg st="1" end="1"/>
-                                            </p:txEl>
-                                          </p:spTgt>
-                                        </p:tgtEl>
-                                        <p:attrNameLst>
-                                          <p:attrName>style.visibility</p:attrName>
-                                        </p:attrNameLst>
-                                      </p:cBhvr>
-                                      <p:to>
-                                        <p:strVal val="visible"/>
-                                      </p:to>
-                                    </p:set>
-                                  </p:childTnLst>
-                                </p:cTn>
-                              </p:par>
-                              <p:par>
-                                <p:cTn id="9" presetID="1" presetClass="entr" presetSubtype="0" fill="hold" grpId="0" nodeType="withEffect">
-                                  <p:stCondLst>
-                                    <p:cond delay="0"/>
-                                  </p:stCondLst>
-                                  <p:childTnLst>
-                                    <p:set>
-                                      <p:cBhvr>
-                                        <p:cTn id="10" dur="1" fill="hold">
-                                          <p:stCondLst>
-                                            <p:cond delay="0"/>
-                                          </p:stCondLst>
-                                        </p:cTn>
-                                        <p:tgtEl>
-                                          <p:spTgt spid="7">
-                                            <p:txEl>
-                                              <p:pRg st="2" end="2"/>
-                                            </p:txEl>
-                                          </p:spTgt>
-                                        </p:tgtEl>
-                                        <p:attrNameLst>
-                                          <p:attrName>style.visibility</p:attrName>
-                                        </p:attrNameLst>
-                                      </p:cBhvr>
-                                      <p:to>
-                                        <p:strVal val="visible"/>
-                                      </p:to>
-                                    </p:set>
-                                  </p:childTnLst>
-                                </p:cTn>
-                              </p:par>
-                              <p:par>
-                                <p:cTn id="11" presetID="1" presetClass="entr" presetSubtype="0" fill="hold" grpId="0" nodeType="withEffect">
-                                  <p:stCondLst>
-                                    <p:cond delay="0"/>
-                                  </p:stCondLst>
-                                  <p:childTnLst>
-                                    <p:set>
-                                      <p:cBhvr>
-                                        <p:cTn id="12" dur="1" fill="hold">
-                                          <p:stCondLst>
-                                            <p:cond delay="0"/>
-                                          </p:stCondLst>
-                                        </p:cTn>
-                                        <p:tgtEl>
-                                          <p:spTgt spid="7">
-                                            <p:txEl>
-                                              <p:pRg st="3" end="3"/>
-                                            </p:txEl>
-                                          </p:spTgt>
-                                        </p:tgtEl>
-                                        <p:attrNameLst>
-                                          <p:attrName>style.visibility</p:attrName>
-                                        </p:attrNameLst>
-                                      </p:cBhvr>
-                                      <p:to>
-                                        <p:strVal val="visible"/>
-                                      </p:to>
-                                    </p:set>
-                                  </p:childTnLst>
-                                </p:cTn>
-                              </p:par>
-                              <p:par>
-                                <p:cTn id="13" presetID="1" presetClass="entr" presetSubtype="0" fill="hold" grpId="0" nodeType="withEffect">
-                                  <p:stCondLst>
-                                    <p:cond delay="0"/>
-                                  </p:stCondLst>
-                                  <p:childTnLst>
-                                    <p:set>
-                                      <p:cBhvr>
-                                        <p:cTn id="14" dur="1" fill="hold">
-                                          <p:stCondLst>
-                                            <p:cond delay="0"/>
-                                          </p:stCondLst>
-                                        </p:cTn>
-                                        <p:tgtEl>
-                                          <p:spTgt spid="7">
-                                            <p:txEl>
-                                              <p:pRg st="4" end="4"/>
-                                            </p:txEl>
-                                          </p:spTgt>
-                                        </p:tgtEl>
-                                        <p:attrNameLst>
-                                          <p:attrName>style.visibility</p:attrName>
-                                        </p:attrNameLst>
-                                      </p:cBhvr>
-                                      <p:to>
-                                        <p:strVal val="visible"/>
-                                      </p:to>
-                                    </p:set>
-                                  </p:childTnLst>
-                                </p:cTn>
-                              </p:par>
-                              <p:par>
-                                <p:cTn id="15" presetID="1" presetClass="entr" presetSubtype="0" fill="hold" grpId="0" nodeType="withEffect">
-                                  <p:stCondLst>
-                                    <p:cond delay="0"/>
-                                  </p:stCondLst>
-                                  <p:childTnLst>
-                                    <p:set>
-                                      <p:cBhvr>
-                                        <p:cTn id="16" dur="1" fill="hold">
-                                          <p:stCondLst>
-                                            <p:cond delay="0"/>
-                                          </p:stCondLst>
-                                        </p:cTn>
-                                        <p:tgtEl>
-                                          <p:spTgt spid="6">
-                                            <p:txEl>
-                                              <p:pRg st="0" end="0"/>
-                                            </p:txEl>
-                                          </p:spTgt>
-                                        </p:tgtEl>
-                                        <p:attrNameLst>
-                                          <p:attrName>style.visibility</p:attrName>
-                                        </p:attrNameLst>
-                                      </p:cBhvr>
-                                      <p:to>
-                                        <p:strVal val="visible"/>
-                                      </p:to>
-                                    </p:set>
-                                  </p:childTnLst>
-                                </p:cTn>
-                              </p:par>
-                            </p:childTnLst>
-                          </p:cTn>
-                        </p:par>
-                      </p:childTnLst>
-                    </p:cTn>
-                  </p:par>
-                </p:childTnLst>
-              </p:cTn>
-              <p:prevCondLst>
-                <p:cond evt="onPrev" delay="0">
-                  <p:tgtEl>
-                    <p:sldTgt/>
-                  </p:tgtEl>
-                </p:cond>
-              </p:prevCondLst>
-              <p:nextCondLst>
-                <p:cond evt="onNext" delay="0">
-                  <p:tgtEl>
-                    <p:sldTgt/>
-                  </p:tgtEl>
-                </p:cond>
-              </p:nextCondLst>
-            </p:seq>
-          </p:childTnLst>
-        </p:cTn>
-      </p:par>
-    </p:tnLst>
-    <p:bldLst>
-      <p:bldP spid="6" grpId="0" build="p"/>
-      <p:bldP spid="7" grpId="0" build="p"/>
     </p:bldLst>
   </p:timing>
 </p:sld>

</xml_diff>